<commit_message>
Updated the figure.pptx for figure 1 (Slide 2)
</commit_message>
<xml_diff>
--- a/p_A15-020/p_A15-020_figures.pptx
+++ b/p_A15-020/p_A15-020_figures.pptx
@@ -6,6 +6,7 @@
   </p:sldMasterIdLst>
   <p:sldIdLst>
     <p:sldId id="257" r:id="rId2"/>
+    <p:sldId id="258" r:id="rId3"/>
   </p:sldIdLst>
   <p:sldSz cx="9144000" cy="6858000" type="screen4x3"/>
   <p:notesSz cx="6858000" cy="9144000"/>
@@ -288,7 +289,7 @@
           <a:p>
             <a:fld id="{FBB2469B-1D9F-7E48-AD20-EE6513EB9BA2}" type="datetimeFigureOut">
               <a:rPr lang="en-US" smtClean="0"/>
-              <a:t>2/3/15</a:t>
+              <a:t>2/20/15</a:t>
             </a:fld>
             <a:endParaRPr lang="en-US"/>
           </a:p>
@@ -458,7 +459,7 @@
           <a:p>
             <a:fld id="{FBB2469B-1D9F-7E48-AD20-EE6513EB9BA2}" type="datetimeFigureOut">
               <a:rPr lang="en-US" smtClean="0"/>
-              <a:t>2/3/15</a:t>
+              <a:t>2/20/15</a:t>
             </a:fld>
             <a:endParaRPr lang="en-US"/>
           </a:p>
@@ -638,7 +639,7 @@
           <a:p>
             <a:fld id="{FBB2469B-1D9F-7E48-AD20-EE6513EB9BA2}" type="datetimeFigureOut">
               <a:rPr lang="en-US" smtClean="0"/>
-              <a:t>2/3/15</a:t>
+              <a:t>2/20/15</a:t>
             </a:fld>
             <a:endParaRPr lang="en-US"/>
           </a:p>
@@ -808,7 +809,7 @@
           <a:p>
             <a:fld id="{FBB2469B-1D9F-7E48-AD20-EE6513EB9BA2}" type="datetimeFigureOut">
               <a:rPr lang="en-US" smtClean="0"/>
-              <a:t>2/3/15</a:t>
+              <a:t>2/20/15</a:t>
             </a:fld>
             <a:endParaRPr lang="en-US"/>
           </a:p>
@@ -1054,7 +1055,7 @@
           <a:p>
             <a:fld id="{FBB2469B-1D9F-7E48-AD20-EE6513EB9BA2}" type="datetimeFigureOut">
               <a:rPr lang="en-US" smtClean="0"/>
-              <a:t>2/3/15</a:t>
+              <a:t>2/20/15</a:t>
             </a:fld>
             <a:endParaRPr lang="en-US"/>
           </a:p>
@@ -1342,7 +1343,7 @@
           <a:p>
             <a:fld id="{FBB2469B-1D9F-7E48-AD20-EE6513EB9BA2}" type="datetimeFigureOut">
               <a:rPr lang="en-US" smtClean="0"/>
-              <a:t>2/3/15</a:t>
+              <a:t>2/20/15</a:t>
             </a:fld>
             <a:endParaRPr lang="en-US"/>
           </a:p>
@@ -1764,7 +1765,7 @@
           <a:p>
             <a:fld id="{FBB2469B-1D9F-7E48-AD20-EE6513EB9BA2}" type="datetimeFigureOut">
               <a:rPr lang="en-US" smtClean="0"/>
-              <a:t>2/3/15</a:t>
+              <a:t>2/20/15</a:t>
             </a:fld>
             <a:endParaRPr lang="en-US"/>
           </a:p>
@@ -1882,7 +1883,7 @@
           <a:p>
             <a:fld id="{FBB2469B-1D9F-7E48-AD20-EE6513EB9BA2}" type="datetimeFigureOut">
               <a:rPr lang="en-US" smtClean="0"/>
-              <a:t>2/3/15</a:t>
+              <a:t>2/20/15</a:t>
             </a:fld>
             <a:endParaRPr lang="en-US"/>
           </a:p>
@@ -1977,7 +1978,7 @@
           <a:p>
             <a:fld id="{FBB2469B-1D9F-7E48-AD20-EE6513EB9BA2}" type="datetimeFigureOut">
               <a:rPr lang="en-US" smtClean="0"/>
-              <a:t>2/3/15</a:t>
+              <a:t>2/20/15</a:t>
             </a:fld>
             <a:endParaRPr lang="en-US"/>
           </a:p>
@@ -2254,7 +2255,7 @@
           <a:p>
             <a:fld id="{FBB2469B-1D9F-7E48-AD20-EE6513EB9BA2}" type="datetimeFigureOut">
               <a:rPr lang="en-US" smtClean="0"/>
-              <a:t>2/3/15</a:t>
+              <a:t>2/20/15</a:t>
             </a:fld>
             <a:endParaRPr lang="en-US"/>
           </a:p>
@@ -2507,7 +2508,7 @@
           <a:p>
             <a:fld id="{FBB2469B-1D9F-7E48-AD20-EE6513EB9BA2}" type="datetimeFigureOut">
               <a:rPr lang="en-US" smtClean="0"/>
-              <a:t>2/3/15</a:t>
+              <a:t>2/20/15</a:t>
             </a:fld>
             <a:endParaRPr lang="en-US"/>
           </a:p>
@@ -2720,7 +2721,7 @@
           <a:p>
             <a:fld id="{FBB2469B-1D9F-7E48-AD20-EE6513EB9BA2}" type="datetimeFigureOut">
               <a:rPr lang="en-US" smtClean="0"/>
-              <a:t>2/3/15</a:t>
+              <a:t>2/20/15</a:t>
             </a:fld>
             <a:endParaRPr lang="en-US"/>
           </a:p>
@@ -3446,10 +3447,6 @@
                 </a:rPr>
                 <a:t>3</a:t>
               </a:r>
-              <a:endParaRPr lang="en-US" sz="1200" dirty="0">
-                <a:latin typeface="Times New Roman"/>
-                <a:cs typeface="Times New Roman"/>
-              </a:endParaRPr>
             </a:p>
           </p:txBody>
         </p:sp>
@@ -3550,13 +3547,6 @@
                 </a:rPr>
                 <a:t>1</a:t>
               </a:r>
-              <a:endParaRPr lang="en-US" sz="1200" dirty="0">
-                <a:solidFill>
-                  <a:srgbClr val="FFFF00"/>
-                </a:solidFill>
-                <a:latin typeface="Times New Roman"/>
-                <a:cs typeface="Times New Roman"/>
-              </a:endParaRPr>
             </a:p>
           </p:txBody>
         </p:sp>
@@ -3747,10 +3737,6 @@
                 </a:rPr>
                 <a:t>5</a:t>
               </a:r>
-              <a:endParaRPr lang="en-US" sz="1200" dirty="0">
-                <a:latin typeface="Times New Roman"/>
-                <a:cs typeface="Times New Roman"/>
-              </a:endParaRPr>
             </a:p>
           </p:txBody>
         </p:sp>
@@ -4658,6 +4644,2161 @@
   <p:clrMapOvr>
     <a:masterClrMapping/>
   </p:clrMapOvr>
+  <p:timing>
+    <p:tnLst>
+      <p:par>
+        <p:cTn xmlns:p14="http://schemas.microsoft.com/office/powerpoint/2010/main" id="1" dur="indefinite" restart="never" nodeType="tmRoot"/>
+      </p:par>
+    </p:tnLst>
+  </p:timing>
+</p:sld>
+</file>
+
+<file path=ppt/slides/slide2.xml><?xml version="1.0" encoding="utf-8"?>
+<p:sld xmlns:a="http://schemas.openxmlformats.org/drawingml/2006/main" xmlns:r="http://schemas.openxmlformats.org/officeDocument/2006/relationships" xmlns:p="http://schemas.openxmlformats.org/presentationml/2006/main">
+  <p:cSld>
+    <p:spTree>
+      <p:nvGrpSpPr>
+        <p:cNvPr id="1" name=""/>
+        <p:cNvGrpSpPr/>
+        <p:nvPr/>
+      </p:nvGrpSpPr>
+      <p:grpSpPr>
+        <a:xfrm>
+          <a:off x="0" y="0"/>
+          <a:ext cx="0" cy="0"/>
+          <a:chOff x="0" y="0"/>
+          <a:chExt cx="0" cy="0"/>
+        </a:xfrm>
+      </p:grpSpPr>
+      <p:sp>
+        <p:nvSpPr>
+          <p:cNvPr id="7" name="TextBox 6"/>
+          <p:cNvSpPr txBox="1"/>
+          <p:nvPr/>
+        </p:nvSpPr>
+        <p:spPr>
+          <a:xfrm>
+            <a:off x="3475619" y="1788439"/>
+            <a:ext cx="389800" cy="276999"/>
+          </a:xfrm>
+          <a:prstGeom prst="rect">
+            <a:avLst/>
+          </a:prstGeom>
+          <a:noFill/>
+        </p:spPr>
+        <p:txBody>
+          <a:bodyPr wrap="none" rtlCol="0">
+            <a:spAutoFit/>
+          </a:bodyPr>
+          <a:lstStyle/>
+          <a:p>
+            <a:r>
+              <a:rPr lang="en-US" sz="1200" dirty="0" smtClean="0">
+                <a:latin typeface="Times New Roman"/>
+                <a:cs typeface="Times New Roman"/>
+              </a:rPr>
+              <a:t>TX</a:t>
+            </a:r>
+            <a:endParaRPr lang="en-US" sz="1200" dirty="0">
+              <a:latin typeface="Times New Roman"/>
+              <a:cs typeface="Times New Roman"/>
+            </a:endParaRPr>
+          </a:p>
+        </p:txBody>
+      </p:sp>
+      <p:cxnSp>
+        <p:nvCxnSpPr>
+          <p:cNvPr id="10" name="Straight Arrow Connector 9"/>
+          <p:cNvCxnSpPr>
+            <a:stCxn id="25" idx="5"/>
+            <a:endCxn id="37" idx="1"/>
+          </p:cNvCxnSpPr>
+          <p:nvPr/>
+        </p:nvCxnSpPr>
+        <p:spPr>
+          <a:xfrm>
+            <a:off x="3756085" y="2179822"/>
+            <a:ext cx="356060" cy="794856"/>
+          </a:xfrm>
+          <a:prstGeom prst="straightConnector1">
+            <a:avLst/>
+          </a:prstGeom>
+          <a:ln w="25400" cmpd="sng">
+            <a:solidFill>
+              <a:schemeClr val="tx1"/>
+            </a:solidFill>
+            <a:prstDash val="solid"/>
+            <a:tailEnd type="stealth" w="lg" len="lg"/>
+          </a:ln>
+          <a:effectLst/>
+        </p:spPr>
+        <p:style>
+          <a:lnRef idx="2">
+            <a:schemeClr val="accent1"/>
+          </a:lnRef>
+          <a:fillRef idx="0">
+            <a:schemeClr val="accent1"/>
+          </a:fillRef>
+          <a:effectRef idx="1">
+            <a:schemeClr val="accent1"/>
+          </a:effectRef>
+          <a:fontRef idx="minor">
+            <a:schemeClr val="tx1"/>
+          </a:fontRef>
+        </p:style>
+      </p:cxnSp>
+      <p:grpSp>
+        <p:nvGrpSpPr>
+          <p:cNvPr id="18" name="Group 17"/>
+          <p:cNvGrpSpPr/>
+          <p:nvPr/>
+        </p:nvGrpSpPr>
+        <p:grpSpPr>
+          <a:xfrm>
+            <a:off x="3599987" y="2010131"/>
+            <a:ext cx="182880" cy="196473"/>
+            <a:chOff x="3718550" y="1332859"/>
+            <a:chExt cx="182880" cy="196473"/>
+          </a:xfrm>
+        </p:grpSpPr>
+        <p:sp>
+          <p:nvSpPr>
+            <p:cNvPr id="25" name="Oval 24"/>
+            <p:cNvSpPr>
+              <a:spLocks/>
+            </p:cNvSpPr>
+            <p:nvPr/>
+          </p:nvSpPr>
+          <p:spPr>
+            <a:xfrm>
+              <a:off x="3718550" y="1346452"/>
+              <a:ext cx="182880" cy="182880"/>
+            </a:xfrm>
+            <a:prstGeom prst="ellipse">
+              <a:avLst/>
+            </a:prstGeom>
+            <a:solidFill>
+              <a:schemeClr val="tx2"/>
+            </a:solidFill>
+            <a:ln>
+              <a:solidFill>
+                <a:schemeClr val="tx1"/>
+              </a:solidFill>
+            </a:ln>
+            <a:effectLst/>
+          </p:spPr>
+          <p:style>
+            <a:lnRef idx="1">
+              <a:schemeClr val="accent1"/>
+            </a:lnRef>
+            <a:fillRef idx="3">
+              <a:schemeClr val="accent1"/>
+            </a:fillRef>
+            <a:effectRef idx="2">
+              <a:schemeClr val="accent1"/>
+            </a:effectRef>
+            <a:fontRef idx="minor">
+              <a:schemeClr val="lt1"/>
+            </a:fontRef>
+          </p:style>
+          <p:txBody>
+            <a:bodyPr rtlCol="0" anchor="ctr"/>
+            <a:lstStyle/>
+            <a:p>
+              <a:pPr algn="ctr"/>
+              <a:endParaRPr lang="en-US"/>
+            </a:p>
+          </p:txBody>
+        </p:sp>
+        <p:sp>
+          <p:nvSpPr>
+            <p:cNvPr id="13" name="TextBox 12"/>
+            <p:cNvSpPr txBox="1"/>
+            <p:nvPr/>
+          </p:nvSpPr>
+          <p:spPr>
+            <a:xfrm>
+              <a:off x="3768780" y="1332859"/>
+              <a:ext cx="95120" cy="184666"/>
+            </a:xfrm>
+            <a:prstGeom prst="rect">
+              <a:avLst/>
+            </a:prstGeom>
+            <a:noFill/>
+          </p:spPr>
+          <p:txBody>
+            <a:bodyPr wrap="none" lIns="0" tIns="0" rIns="0" bIns="0" rtlCol="0" anchor="ctr" anchorCtr="0">
+              <a:spAutoFit/>
+            </a:bodyPr>
+            <a:lstStyle/>
+            <a:p>
+              <a:pPr algn="ctr"/>
+              <a:r>
+                <a:rPr lang="en-US" sz="1200" i="1" dirty="0">
+                  <a:solidFill>
+                    <a:schemeClr val="bg1"/>
+                  </a:solidFill>
+                  <a:latin typeface="Times New Roman"/>
+                  <a:cs typeface="Times New Roman"/>
+                </a:rPr>
+                <a:t>t</a:t>
+              </a:r>
+              <a:endParaRPr lang="en-US" sz="1200" i="1" dirty="0">
+                <a:solidFill>
+                  <a:schemeClr val="bg1"/>
+                </a:solidFill>
+                <a:latin typeface="Times New Roman"/>
+                <a:cs typeface="Times New Roman"/>
+              </a:endParaRPr>
+            </a:p>
+          </p:txBody>
+        </p:sp>
+      </p:grpSp>
+      <p:sp>
+        <p:nvSpPr>
+          <p:cNvPr id="15" name="TextBox 14"/>
+          <p:cNvSpPr txBox="1"/>
+          <p:nvPr/>
+        </p:nvSpPr>
+        <p:spPr>
+          <a:xfrm>
+            <a:off x="4008185" y="2369459"/>
+            <a:ext cx="400222" cy="276999"/>
+          </a:xfrm>
+          <a:prstGeom prst="rect">
+            <a:avLst/>
+          </a:prstGeom>
+          <a:noFill/>
+        </p:spPr>
+        <p:txBody>
+          <a:bodyPr wrap="none" rtlCol="0">
+            <a:spAutoFit/>
+          </a:bodyPr>
+          <a:lstStyle>
+            <a:defPPr>
+              <a:defRPr lang="en-US"/>
+            </a:defPPr>
+            <a:lvl1pPr>
+              <a:defRPr sz="1200">
+                <a:latin typeface="Times New Roman"/>
+                <a:cs typeface="Times New Roman"/>
+              </a:defRPr>
+            </a:lvl1pPr>
+          </a:lstStyle>
+          <a:p>
+            <a:r>
+              <a:rPr lang="en-US" b="1" dirty="0" err="1" smtClean="0"/>
+              <a:t>H</a:t>
+            </a:r>
+            <a:r>
+              <a:rPr lang="en-US" i="1" baseline="-25000" dirty="0" err="1" smtClean="0"/>
+              <a:t>rt</a:t>
+            </a:r>
+            <a:endParaRPr lang="en-US" i="1" dirty="0"/>
+          </a:p>
+        </p:txBody>
+      </p:sp>
+      <p:grpSp>
+        <p:nvGrpSpPr>
+          <p:cNvPr id="39" name="Group 38"/>
+          <p:cNvGrpSpPr/>
+          <p:nvPr/>
+        </p:nvGrpSpPr>
+        <p:grpSpPr>
+          <a:xfrm>
+            <a:off x="2833052" y="2652808"/>
+            <a:ext cx="180763" cy="276999"/>
+            <a:chOff x="2133071" y="1580732"/>
+            <a:chExt cx="180763" cy="276999"/>
+          </a:xfrm>
+        </p:grpSpPr>
+        <p:sp>
+          <p:nvSpPr>
+            <p:cNvPr id="34" name="Oval 33"/>
+            <p:cNvSpPr>
+              <a:spLocks/>
+            </p:cNvSpPr>
+            <p:nvPr/>
+          </p:nvSpPr>
+          <p:spPr>
+            <a:xfrm>
+              <a:off x="2133071" y="1640491"/>
+              <a:ext cx="180763" cy="182880"/>
+            </a:xfrm>
+            <a:prstGeom prst="ellipse">
+              <a:avLst/>
+            </a:prstGeom>
+            <a:noFill/>
+            <a:ln>
+              <a:solidFill>
+                <a:schemeClr val="tx1"/>
+              </a:solidFill>
+            </a:ln>
+            <a:effectLst/>
+          </p:spPr>
+          <p:style>
+            <a:lnRef idx="1">
+              <a:schemeClr val="accent1"/>
+            </a:lnRef>
+            <a:fillRef idx="3">
+              <a:schemeClr val="accent1"/>
+            </a:fillRef>
+            <a:effectRef idx="2">
+              <a:schemeClr val="accent1"/>
+            </a:effectRef>
+            <a:fontRef idx="minor">
+              <a:schemeClr val="lt1"/>
+            </a:fontRef>
+          </p:style>
+          <p:txBody>
+            <a:bodyPr rtlCol="0" anchor="ctr"/>
+            <a:lstStyle/>
+            <a:p>
+              <a:pPr algn="ctr"/>
+              <a:endParaRPr lang="en-US"/>
+            </a:p>
+          </p:txBody>
+        </p:sp>
+        <p:sp>
+          <p:nvSpPr>
+            <p:cNvPr id="35" name="TextBox 34"/>
+            <p:cNvSpPr txBox="1"/>
+            <p:nvPr/>
+          </p:nvSpPr>
+          <p:spPr>
+            <a:xfrm>
+              <a:off x="2191330" y="1580732"/>
+              <a:ext cx="76944" cy="276999"/>
+            </a:xfrm>
+            <a:prstGeom prst="rect">
+              <a:avLst/>
+            </a:prstGeom>
+            <a:noFill/>
+          </p:spPr>
+          <p:txBody>
+            <a:bodyPr wrap="none" lIns="0" tIns="0" rIns="0" bIns="0" rtlCol="0" anchor="ctr" anchorCtr="0">
+              <a:noAutofit/>
+            </a:bodyPr>
+            <a:lstStyle/>
+            <a:p>
+              <a:pPr algn="ctr"/>
+              <a:r>
+                <a:rPr lang="en-US" sz="1200" dirty="0">
+                  <a:latin typeface="Times New Roman"/>
+                  <a:cs typeface="Times New Roman"/>
+                </a:rPr>
+                <a:t>1</a:t>
+              </a:r>
+              <a:endParaRPr lang="en-US" sz="1200" dirty="0">
+                <a:latin typeface="Times New Roman"/>
+                <a:cs typeface="Times New Roman"/>
+              </a:endParaRPr>
+            </a:p>
+          </p:txBody>
+        </p:sp>
+      </p:grpSp>
+      <p:grpSp>
+        <p:nvGrpSpPr>
+          <p:cNvPr id="26" name="Group 25"/>
+          <p:cNvGrpSpPr/>
+          <p:nvPr/>
+        </p:nvGrpSpPr>
+        <p:grpSpPr>
+          <a:xfrm>
+            <a:off x="4085363" y="2915253"/>
+            <a:ext cx="182880" cy="215523"/>
+            <a:chOff x="4316794" y="1086672"/>
+            <a:chExt cx="182880" cy="215523"/>
+          </a:xfrm>
+        </p:grpSpPr>
+        <p:sp>
+          <p:nvSpPr>
+            <p:cNvPr id="37" name="Oval 36"/>
+            <p:cNvSpPr>
+              <a:spLocks/>
+            </p:cNvSpPr>
+            <p:nvPr/>
+          </p:nvSpPr>
+          <p:spPr>
+            <a:xfrm>
+              <a:off x="4316794" y="1119315"/>
+              <a:ext cx="182880" cy="182880"/>
+            </a:xfrm>
+            <a:prstGeom prst="ellipse">
+              <a:avLst/>
+            </a:prstGeom>
+            <a:solidFill>
+              <a:srgbClr val="FF0000"/>
+            </a:solidFill>
+            <a:ln>
+              <a:solidFill>
+                <a:schemeClr val="tx1"/>
+              </a:solidFill>
+            </a:ln>
+            <a:effectLst/>
+          </p:spPr>
+          <p:style>
+            <a:lnRef idx="1">
+              <a:schemeClr val="accent1"/>
+            </a:lnRef>
+            <a:fillRef idx="3">
+              <a:schemeClr val="accent1"/>
+            </a:fillRef>
+            <a:effectRef idx="2">
+              <a:schemeClr val="accent1"/>
+            </a:effectRef>
+            <a:fontRef idx="minor">
+              <a:schemeClr val="lt1"/>
+            </a:fontRef>
+          </p:style>
+          <p:txBody>
+            <a:bodyPr rtlCol="0" anchor="ctr"/>
+            <a:lstStyle/>
+            <a:p>
+              <a:pPr algn="ctr"/>
+              <a:endParaRPr lang="en-US"/>
+            </a:p>
+          </p:txBody>
+        </p:sp>
+        <p:sp>
+          <p:nvSpPr>
+            <p:cNvPr id="38" name="TextBox 37"/>
+            <p:cNvSpPr txBox="1"/>
+            <p:nvPr/>
+          </p:nvSpPr>
+          <p:spPr>
+            <a:xfrm>
+              <a:off x="4371158" y="1086672"/>
+              <a:ext cx="112252" cy="184666"/>
+            </a:xfrm>
+            <a:prstGeom prst="rect">
+              <a:avLst/>
+            </a:prstGeom>
+            <a:noFill/>
+          </p:spPr>
+          <p:txBody>
+            <a:bodyPr wrap="none" lIns="0" tIns="0" rIns="0" bIns="0" rtlCol="0" anchor="ctr" anchorCtr="0">
+              <a:spAutoFit/>
+            </a:bodyPr>
+            <a:lstStyle/>
+            <a:p>
+              <a:pPr algn="ctr"/>
+              <a:r>
+                <a:rPr lang="en-US" sz="1200" i="1" dirty="0">
+                  <a:solidFill>
+                    <a:srgbClr val="FFFF00"/>
+                  </a:solidFill>
+                  <a:latin typeface="Times New Roman"/>
+                  <a:cs typeface="Times New Roman"/>
+                </a:rPr>
+                <a:t>r</a:t>
+              </a:r>
+              <a:endParaRPr lang="en-US" sz="1200" i="1" dirty="0">
+                <a:solidFill>
+                  <a:srgbClr val="FFFF00"/>
+                </a:solidFill>
+                <a:latin typeface="Times New Roman"/>
+                <a:cs typeface="Times New Roman"/>
+              </a:endParaRPr>
+            </a:p>
+          </p:txBody>
+        </p:sp>
+      </p:grpSp>
+      <p:grpSp>
+        <p:nvGrpSpPr>
+          <p:cNvPr id="40" name="Group 39"/>
+          <p:cNvGrpSpPr/>
+          <p:nvPr/>
+        </p:nvGrpSpPr>
+        <p:grpSpPr>
+          <a:xfrm>
+            <a:off x="3080437" y="3455222"/>
+            <a:ext cx="180763" cy="276999"/>
+            <a:chOff x="2133071" y="1580732"/>
+            <a:chExt cx="180763" cy="276999"/>
+          </a:xfrm>
+        </p:grpSpPr>
+        <p:sp>
+          <p:nvSpPr>
+            <p:cNvPr id="41" name="Oval 40"/>
+            <p:cNvSpPr>
+              <a:spLocks/>
+            </p:cNvSpPr>
+            <p:nvPr/>
+          </p:nvSpPr>
+          <p:spPr>
+            <a:xfrm>
+              <a:off x="2133071" y="1640491"/>
+              <a:ext cx="180763" cy="182880"/>
+            </a:xfrm>
+            <a:prstGeom prst="ellipse">
+              <a:avLst/>
+            </a:prstGeom>
+            <a:noFill/>
+            <a:ln>
+              <a:solidFill>
+                <a:schemeClr val="tx1"/>
+              </a:solidFill>
+            </a:ln>
+            <a:effectLst/>
+          </p:spPr>
+          <p:style>
+            <a:lnRef idx="1">
+              <a:schemeClr val="accent1"/>
+            </a:lnRef>
+            <a:fillRef idx="3">
+              <a:schemeClr val="accent1"/>
+            </a:fillRef>
+            <a:effectRef idx="2">
+              <a:schemeClr val="accent1"/>
+            </a:effectRef>
+            <a:fontRef idx="minor">
+              <a:schemeClr val="lt1"/>
+            </a:fontRef>
+          </p:style>
+          <p:txBody>
+            <a:bodyPr rtlCol="0" anchor="ctr"/>
+            <a:lstStyle/>
+            <a:p>
+              <a:pPr algn="ctr"/>
+              <a:endParaRPr lang="en-US"/>
+            </a:p>
+          </p:txBody>
+        </p:sp>
+        <p:sp>
+          <p:nvSpPr>
+            <p:cNvPr id="42" name="TextBox 41"/>
+            <p:cNvSpPr txBox="1"/>
+            <p:nvPr/>
+          </p:nvSpPr>
+          <p:spPr>
+            <a:xfrm>
+              <a:off x="2191330" y="1580732"/>
+              <a:ext cx="76944" cy="276999"/>
+            </a:xfrm>
+            <a:prstGeom prst="rect">
+              <a:avLst/>
+            </a:prstGeom>
+            <a:noFill/>
+          </p:spPr>
+          <p:txBody>
+            <a:bodyPr wrap="none" lIns="0" tIns="0" rIns="0" bIns="0" rtlCol="0" anchor="ctr" anchorCtr="0">
+              <a:noAutofit/>
+            </a:bodyPr>
+            <a:lstStyle/>
+            <a:p>
+              <a:pPr algn="ctr"/>
+              <a:r>
+                <a:rPr lang="en-US" sz="1200" dirty="0">
+                  <a:latin typeface="Times New Roman"/>
+                  <a:cs typeface="Times New Roman"/>
+                </a:rPr>
+                <a:t>2</a:t>
+              </a:r>
+              <a:endParaRPr lang="en-US" sz="1200" dirty="0">
+                <a:latin typeface="Times New Roman"/>
+                <a:cs typeface="Times New Roman"/>
+              </a:endParaRPr>
+            </a:p>
+          </p:txBody>
+        </p:sp>
+      </p:grpSp>
+      <p:grpSp>
+        <p:nvGrpSpPr>
+          <p:cNvPr id="28" name="Group 27"/>
+          <p:cNvGrpSpPr/>
+          <p:nvPr/>
+        </p:nvGrpSpPr>
+        <p:grpSpPr>
+          <a:xfrm>
+            <a:off x="4280632" y="3934903"/>
+            <a:ext cx="180763" cy="276999"/>
+            <a:chOff x="4261582" y="3941253"/>
+            <a:chExt cx="180763" cy="276999"/>
+          </a:xfrm>
+        </p:grpSpPr>
+        <p:sp>
+          <p:nvSpPr>
+            <p:cNvPr id="44" name="Oval 43"/>
+            <p:cNvSpPr>
+              <a:spLocks/>
+            </p:cNvSpPr>
+            <p:nvPr/>
+          </p:nvSpPr>
+          <p:spPr>
+            <a:xfrm>
+              <a:off x="4261582" y="4020062"/>
+              <a:ext cx="180763" cy="182880"/>
+            </a:xfrm>
+            <a:prstGeom prst="ellipse">
+              <a:avLst/>
+            </a:prstGeom>
+            <a:noFill/>
+            <a:ln>
+              <a:solidFill>
+                <a:schemeClr val="tx1"/>
+              </a:solidFill>
+            </a:ln>
+            <a:effectLst/>
+          </p:spPr>
+          <p:style>
+            <a:lnRef idx="1">
+              <a:schemeClr val="accent1"/>
+            </a:lnRef>
+            <a:fillRef idx="3">
+              <a:schemeClr val="accent1"/>
+            </a:fillRef>
+            <a:effectRef idx="2">
+              <a:schemeClr val="accent1"/>
+            </a:effectRef>
+            <a:fontRef idx="minor">
+              <a:schemeClr val="lt1"/>
+            </a:fontRef>
+          </p:style>
+          <p:txBody>
+            <a:bodyPr rtlCol="0" anchor="ctr"/>
+            <a:lstStyle/>
+            <a:p>
+              <a:pPr algn="ctr"/>
+              <a:endParaRPr lang="en-US"/>
+            </a:p>
+          </p:txBody>
+        </p:sp>
+        <p:sp>
+          <p:nvSpPr>
+            <p:cNvPr id="45" name="TextBox 44"/>
+            <p:cNvSpPr txBox="1"/>
+            <p:nvPr/>
+          </p:nvSpPr>
+          <p:spPr>
+            <a:xfrm>
+              <a:off x="4332541" y="3941253"/>
+              <a:ext cx="76944" cy="276999"/>
+            </a:xfrm>
+            <a:prstGeom prst="rect">
+              <a:avLst/>
+            </a:prstGeom>
+            <a:noFill/>
+          </p:spPr>
+          <p:txBody>
+            <a:bodyPr wrap="none" lIns="0" tIns="0" rIns="0" bIns="0" rtlCol="0" anchor="ctr" anchorCtr="0">
+              <a:noAutofit/>
+            </a:bodyPr>
+            <a:lstStyle/>
+            <a:p>
+              <a:pPr algn="ctr"/>
+              <a:r>
+                <a:rPr lang="en-US" sz="1200" i="1" dirty="0">
+                  <a:latin typeface="Times New Roman"/>
+                  <a:cs typeface="Times New Roman"/>
+                </a:rPr>
+                <a:t>j</a:t>
+              </a:r>
+              <a:endParaRPr lang="en-US" sz="1200" i="1" dirty="0">
+                <a:latin typeface="Times New Roman"/>
+                <a:cs typeface="Times New Roman"/>
+              </a:endParaRPr>
+            </a:p>
+          </p:txBody>
+        </p:sp>
+      </p:grpSp>
+      <p:grpSp>
+        <p:nvGrpSpPr>
+          <p:cNvPr id="46" name="Group 45"/>
+          <p:cNvGrpSpPr/>
+          <p:nvPr/>
+        </p:nvGrpSpPr>
+        <p:grpSpPr>
+          <a:xfrm>
+            <a:off x="5746563" y="3909922"/>
+            <a:ext cx="180763" cy="276999"/>
+            <a:chOff x="2133071" y="1574382"/>
+            <a:chExt cx="180763" cy="276999"/>
+          </a:xfrm>
+        </p:grpSpPr>
+        <p:sp>
+          <p:nvSpPr>
+            <p:cNvPr id="48" name="TextBox 47"/>
+            <p:cNvSpPr txBox="1"/>
+            <p:nvPr/>
+          </p:nvSpPr>
+          <p:spPr>
+            <a:xfrm>
+              <a:off x="2204030" y="1574382"/>
+              <a:ext cx="76944" cy="276999"/>
+            </a:xfrm>
+            <a:prstGeom prst="rect">
+              <a:avLst/>
+            </a:prstGeom>
+            <a:noFill/>
+          </p:spPr>
+          <p:txBody>
+            <a:bodyPr wrap="none" lIns="0" tIns="0" rIns="0" bIns="0" rtlCol="0" anchor="ctr" anchorCtr="0">
+              <a:noAutofit/>
+            </a:bodyPr>
+            <a:lstStyle/>
+            <a:p>
+              <a:pPr algn="ctr"/>
+              <a:r>
+                <a:rPr lang="en-US" sz="1200" i="1" dirty="0">
+                  <a:latin typeface="Times New Roman"/>
+                  <a:cs typeface="Times New Roman"/>
+                </a:rPr>
+                <a:t>k</a:t>
+              </a:r>
+            </a:p>
+          </p:txBody>
+        </p:sp>
+        <p:sp>
+          <p:nvSpPr>
+            <p:cNvPr id="47" name="Oval 46"/>
+            <p:cNvSpPr>
+              <a:spLocks/>
+            </p:cNvSpPr>
+            <p:nvPr/>
+          </p:nvSpPr>
+          <p:spPr>
+            <a:xfrm>
+              <a:off x="2133071" y="1640491"/>
+              <a:ext cx="180763" cy="182880"/>
+            </a:xfrm>
+            <a:prstGeom prst="ellipse">
+              <a:avLst/>
+            </a:prstGeom>
+            <a:noFill/>
+            <a:ln>
+              <a:solidFill>
+                <a:schemeClr val="tx1"/>
+              </a:solidFill>
+            </a:ln>
+            <a:effectLst/>
+          </p:spPr>
+          <p:style>
+            <a:lnRef idx="1">
+              <a:schemeClr val="accent1"/>
+            </a:lnRef>
+            <a:fillRef idx="3">
+              <a:schemeClr val="accent1"/>
+            </a:fillRef>
+            <a:effectRef idx="2">
+              <a:schemeClr val="accent1"/>
+            </a:effectRef>
+            <a:fontRef idx="minor">
+              <a:schemeClr val="lt1"/>
+            </a:fontRef>
+          </p:style>
+          <p:txBody>
+            <a:bodyPr rtlCol="0" anchor="ctr"/>
+            <a:lstStyle/>
+            <a:p>
+              <a:pPr algn="ctr"/>
+              <a:endParaRPr lang="en-US"/>
+            </a:p>
+          </p:txBody>
+        </p:sp>
+      </p:grpSp>
+      <p:grpSp>
+        <p:nvGrpSpPr>
+          <p:cNvPr id="49" name="Group 48"/>
+          <p:cNvGrpSpPr/>
+          <p:nvPr/>
+        </p:nvGrpSpPr>
+        <p:grpSpPr>
+          <a:xfrm>
+            <a:off x="4904090" y="1733132"/>
+            <a:ext cx="180763" cy="276999"/>
+            <a:chOff x="2133071" y="1580732"/>
+            <a:chExt cx="180763" cy="276999"/>
+          </a:xfrm>
+        </p:grpSpPr>
+        <p:sp>
+          <p:nvSpPr>
+            <p:cNvPr id="50" name="Oval 49"/>
+            <p:cNvSpPr>
+              <a:spLocks/>
+            </p:cNvSpPr>
+            <p:nvPr/>
+          </p:nvSpPr>
+          <p:spPr>
+            <a:xfrm>
+              <a:off x="2133071" y="1640491"/>
+              <a:ext cx="180763" cy="182880"/>
+            </a:xfrm>
+            <a:prstGeom prst="ellipse">
+              <a:avLst/>
+            </a:prstGeom>
+            <a:noFill/>
+            <a:ln>
+              <a:solidFill>
+                <a:schemeClr val="tx1"/>
+              </a:solidFill>
+            </a:ln>
+            <a:effectLst/>
+          </p:spPr>
+          <p:style>
+            <a:lnRef idx="1">
+              <a:schemeClr val="accent1"/>
+            </a:lnRef>
+            <a:fillRef idx="3">
+              <a:schemeClr val="accent1"/>
+            </a:fillRef>
+            <a:effectRef idx="2">
+              <a:schemeClr val="accent1"/>
+            </a:effectRef>
+            <a:fontRef idx="minor">
+              <a:schemeClr val="lt1"/>
+            </a:fontRef>
+          </p:style>
+          <p:txBody>
+            <a:bodyPr rtlCol="0" anchor="ctr"/>
+            <a:lstStyle/>
+            <a:p>
+              <a:pPr algn="ctr"/>
+              <a:endParaRPr lang="en-US"/>
+            </a:p>
+          </p:txBody>
+        </p:sp>
+        <p:sp>
+          <p:nvSpPr>
+            <p:cNvPr id="51" name="TextBox 50"/>
+            <p:cNvSpPr txBox="1"/>
+            <p:nvPr/>
+          </p:nvSpPr>
+          <p:spPr>
+            <a:xfrm>
+              <a:off x="2191330" y="1580732"/>
+              <a:ext cx="76944" cy="276999"/>
+            </a:xfrm>
+            <a:prstGeom prst="rect">
+              <a:avLst/>
+            </a:prstGeom>
+            <a:noFill/>
+          </p:spPr>
+          <p:txBody>
+            <a:bodyPr wrap="none" lIns="0" tIns="0" rIns="0" bIns="0" rtlCol="0" anchor="ctr" anchorCtr="0">
+              <a:noAutofit/>
+            </a:bodyPr>
+            <a:lstStyle/>
+            <a:p>
+              <a:pPr algn="ctr"/>
+              <a:r>
+                <a:rPr lang="en-US" sz="1200" i="1" dirty="0">
+                  <a:latin typeface="Times New Roman"/>
+                  <a:cs typeface="Times New Roman"/>
+                </a:rPr>
+                <a:t>N</a:t>
+              </a:r>
+              <a:endParaRPr lang="en-US" sz="1200" i="1" dirty="0">
+                <a:latin typeface="Times New Roman"/>
+                <a:cs typeface="Times New Roman"/>
+              </a:endParaRPr>
+            </a:p>
+          </p:txBody>
+        </p:sp>
+      </p:grpSp>
+      <p:cxnSp>
+        <p:nvCxnSpPr>
+          <p:cNvPr id="55" name="Straight Arrow Connector 54"/>
+          <p:cNvCxnSpPr>
+            <a:stCxn id="34" idx="6"/>
+            <a:endCxn id="37" idx="2"/>
+          </p:cNvCxnSpPr>
+          <p:nvPr/>
+        </p:nvCxnSpPr>
+        <p:spPr>
+          <a:xfrm>
+            <a:off x="3013815" y="2804007"/>
+            <a:ext cx="1071548" cy="235329"/>
+          </a:xfrm>
+          <a:prstGeom prst="straightConnector1">
+            <a:avLst/>
+          </a:prstGeom>
+          <a:ln w="12700" cmpd="sng">
+            <a:solidFill>
+              <a:schemeClr val="tx1"/>
+            </a:solidFill>
+            <a:prstDash val="sysDash"/>
+            <a:tailEnd type="stealth" w="lg" len="lg"/>
+          </a:ln>
+          <a:effectLst/>
+        </p:spPr>
+        <p:style>
+          <a:lnRef idx="2">
+            <a:schemeClr val="accent1"/>
+          </a:lnRef>
+          <a:fillRef idx="0">
+            <a:schemeClr val="accent1"/>
+          </a:fillRef>
+          <a:effectRef idx="1">
+            <a:schemeClr val="accent1"/>
+          </a:effectRef>
+          <a:fontRef idx="minor">
+            <a:schemeClr val="tx1"/>
+          </a:fontRef>
+        </p:style>
+      </p:cxnSp>
+      <p:cxnSp>
+        <p:nvCxnSpPr>
+          <p:cNvPr id="58" name="Straight Arrow Connector 57"/>
+          <p:cNvCxnSpPr>
+            <a:stCxn id="41" idx="6"/>
+            <a:endCxn id="37" idx="3"/>
+          </p:cNvCxnSpPr>
+          <p:nvPr/>
+        </p:nvCxnSpPr>
+        <p:spPr>
+          <a:xfrm flipV="1">
+            <a:off x="3261200" y="3103994"/>
+            <a:ext cx="850945" cy="502427"/>
+          </a:xfrm>
+          <a:prstGeom prst="straightConnector1">
+            <a:avLst/>
+          </a:prstGeom>
+          <a:ln w="12700" cmpd="sng">
+            <a:solidFill>
+              <a:schemeClr val="tx1"/>
+            </a:solidFill>
+            <a:prstDash val="sysDash"/>
+            <a:tailEnd type="stealth" w="lg" len="lg"/>
+          </a:ln>
+          <a:effectLst/>
+        </p:spPr>
+        <p:style>
+          <a:lnRef idx="2">
+            <a:schemeClr val="accent1"/>
+          </a:lnRef>
+          <a:fillRef idx="0">
+            <a:schemeClr val="accent1"/>
+          </a:fillRef>
+          <a:effectRef idx="1">
+            <a:schemeClr val="accent1"/>
+          </a:effectRef>
+          <a:fontRef idx="minor">
+            <a:schemeClr val="tx1"/>
+          </a:fontRef>
+        </p:style>
+      </p:cxnSp>
+      <p:cxnSp>
+        <p:nvCxnSpPr>
+          <p:cNvPr id="61" name="Straight Arrow Connector 60"/>
+          <p:cNvCxnSpPr>
+            <a:stCxn id="60" idx="2"/>
+            <a:endCxn id="37" idx="6"/>
+          </p:cNvCxnSpPr>
+          <p:nvPr/>
+        </p:nvCxnSpPr>
+        <p:spPr>
+          <a:xfrm flipH="1" flipV="1">
+            <a:off x="4268243" y="3039336"/>
+            <a:ext cx="1239080" cy="434935"/>
+          </a:xfrm>
+          <a:prstGeom prst="straightConnector1">
+            <a:avLst/>
+          </a:prstGeom>
+          <a:ln w="12700" cmpd="sng">
+            <a:solidFill>
+              <a:schemeClr val="tx1"/>
+            </a:solidFill>
+            <a:prstDash val="sysDash"/>
+            <a:tailEnd type="stealth" w="lg" len="lg"/>
+          </a:ln>
+          <a:effectLst/>
+        </p:spPr>
+        <p:style>
+          <a:lnRef idx="2">
+            <a:schemeClr val="accent1"/>
+          </a:lnRef>
+          <a:fillRef idx="0">
+            <a:schemeClr val="accent1"/>
+          </a:fillRef>
+          <a:effectRef idx="1">
+            <a:schemeClr val="accent1"/>
+          </a:effectRef>
+          <a:fontRef idx="minor">
+            <a:schemeClr val="tx1"/>
+          </a:fontRef>
+        </p:style>
+      </p:cxnSp>
+      <p:cxnSp>
+        <p:nvCxnSpPr>
+          <p:cNvPr id="69" name="Straight Arrow Connector 68"/>
+          <p:cNvCxnSpPr>
+            <a:stCxn id="50" idx="3"/>
+            <a:endCxn id="37" idx="7"/>
+          </p:cNvCxnSpPr>
+          <p:nvPr/>
+        </p:nvCxnSpPr>
+        <p:spPr>
+          <a:xfrm flipH="1">
+            <a:off x="4241461" y="1948989"/>
+            <a:ext cx="689101" cy="1025689"/>
+          </a:xfrm>
+          <a:prstGeom prst="straightConnector1">
+            <a:avLst/>
+          </a:prstGeom>
+          <a:ln w="12700" cmpd="sng">
+            <a:solidFill>
+              <a:schemeClr val="tx1"/>
+            </a:solidFill>
+            <a:prstDash val="sysDash"/>
+            <a:tailEnd type="stealth" w="lg" len="lg"/>
+          </a:ln>
+          <a:effectLst/>
+        </p:spPr>
+        <p:style>
+          <a:lnRef idx="2">
+            <a:schemeClr val="accent1"/>
+          </a:lnRef>
+          <a:fillRef idx="0">
+            <a:schemeClr val="accent1"/>
+          </a:fillRef>
+          <a:effectRef idx="1">
+            <a:schemeClr val="accent1"/>
+          </a:effectRef>
+          <a:fontRef idx="minor">
+            <a:schemeClr val="tx1"/>
+          </a:fontRef>
+        </p:style>
+      </p:cxnSp>
+      <p:sp>
+        <p:nvSpPr>
+          <p:cNvPr id="71" name="Oval 70"/>
+          <p:cNvSpPr/>
+          <p:nvPr/>
+        </p:nvSpPr>
+        <p:spPr>
+          <a:xfrm>
+            <a:off x="6994349" y="3901121"/>
+            <a:ext cx="27432" cy="27432"/>
+          </a:xfrm>
+          <a:prstGeom prst="ellipse">
+            <a:avLst/>
+          </a:prstGeom>
+          <a:solidFill>
+            <a:schemeClr val="tx1"/>
+          </a:solidFill>
+          <a:ln>
+            <a:noFill/>
+          </a:ln>
+          <a:effectLst/>
+        </p:spPr>
+        <p:style>
+          <a:lnRef idx="1">
+            <a:schemeClr val="accent1"/>
+          </a:lnRef>
+          <a:fillRef idx="3">
+            <a:schemeClr val="accent1"/>
+          </a:fillRef>
+          <a:effectRef idx="2">
+            <a:schemeClr val="accent1"/>
+          </a:effectRef>
+          <a:fontRef idx="minor">
+            <a:schemeClr val="lt1"/>
+          </a:fontRef>
+        </p:style>
+        <p:txBody>
+          <a:bodyPr rtlCol="0" anchor="ctr"/>
+          <a:lstStyle/>
+          <a:p>
+            <a:pPr algn="ctr"/>
+            <a:endParaRPr lang="en-US"/>
+          </a:p>
+        </p:txBody>
+      </p:sp>
+      <p:sp>
+        <p:nvSpPr>
+          <p:cNvPr id="72" name="Oval 71"/>
+          <p:cNvSpPr/>
+          <p:nvPr/>
+        </p:nvSpPr>
+        <p:spPr>
+          <a:xfrm>
+            <a:off x="6899099" y="3697861"/>
+            <a:ext cx="27432" cy="27432"/>
+          </a:xfrm>
+          <a:prstGeom prst="ellipse">
+            <a:avLst/>
+          </a:prstGeom>
+          <a:solidFill>
+            <a:schemeClr val="tx1"/>
+          </a:solidFill>
+          <a:ln>
+            <a:noFill/>
+          </a:ln>
+          <a:effectLst/>
+        </p:spPr>
+        <p:style>
+          <a:lnRef idx="1">
+            <a:schemeClr val="accent1"/>
+          </a:lnRef>
+          <a:fillRef idx="3">
+            <a:schemeClr val="accent1"/>
+          </a:fillRef>
+          <a:effectRef idx="2">
+            <a:schemeClr val="accent1"/>
+          </a:effectRef>
+          <a:fontRef idx="minor">
+            <a:schemeClr val="lt1"/>
+          </a:fontRef>
+        </p:style>
+        <p:txBody>
+          <a:bodyPr rtlCol="0" anchor="ctr"/>
+          <a:lstStyle/>
+          <a:p>
+            <a:pPr algn="ctr"/>
+            <a:endParaRPr lang="en-US"/>
+          </a:p>
+        </p:txBody>
+      </p:sp>
+      <p:sp>
+        <p:nvSpPr>
+          <p:cNvPr id="73" name="Oval 72"/>
+          <p:cNvSpPr/>
+          <p:nvPr/>
+        </p:nvSpPr>
+        <p:spPr>
+          <a:xfrm>
+            <a:off x="7368999" y="3873624"/>
+            <a:ext cx="27432" cy="27432"/>
+          </a:xfrm>
+          <a:prstGeom prst="ellipse">
+            <a:avLst/>
+          </a:prstGeom>
+          <a:solidFill>
+            <a:schemeClr val="tx1"/>
+          </a:solidFill>
+          <a:ln>
+            <a:noFill/>
+          </a:ln>
+          <a:effectLst/>
+        </p:spPr>
+        <p:style>
+          <a:lnRef idx="1">
+            <a:schemeClr val="accent1"/>
+          </a:lnRef>
+          <a:fillRef idx="3">
+            <a:schemeClr val="accent1"/>
+          </a:fillRef>
+          <a:effectRef idx="2">
+            <a:schemeClr val="accent1"/>
+          </a:effectRef>
+          <a:fontRef idx="minor">
+            <a:schemeClr val="lt1"/>
+          </a:fontRef>
+        </p:style>
+        <p:txBody>
+          <a:bodyPr rtlCol="0" anchor="ctr"/>
+          <a:lstStyle/>
+          <a:p>
+            <a:pPr algn="ctr"/>
+            <a:endParaRPr lang="en-US"/>
+          </a:p>
+        </p:txBody>
+      </p:sp>
+      <p:sp>
+        <p:nvSpPr>
+          <p:cNvPr id="74" name="Oval 73"/>
+          <p:cNvSpPr/>
+          <p:nvPr/>
+        </p:nvSpPr>
+        <p:spPr>
+          <a:xfrm>
+            <a:off x="7495999" y="2360103"/>
+            <a:ext cx="27432" cy="27432"/>
+          </a:xfrm>
+          <a:prstGeom prst="ellipse">
+            <a:avLst/>
+          </a:prstGeom>
+          <a:solidFill>
+            <a:schemeClr val="tx1"/>
+          </a:solidFill>
+          <a:ln>
+            <a:noFill/>
+          </a:ln>
+          <a:effectLst/>
+        </p:spPr>
+        <p:style>
+          <a:lnRef idx="1">
+            <a:schemeClr val="accent1"/>
+          </a:lnRef>
+          <a:fillRef idx="3">
+            <a:schemeClr val="accent1"/>
+          </a:fillRef>
+          <a:effectRef idx="2">
+            <a:schemeClr val="accent1"/>
+          </a:effectRef>
+          <a:fontRef idx="minor">
+            <a:schemeClr val="lt1"/>
+          </a:fontRef>
+        </p:style>
+        <p:txBody>
+          <a:bodyPr rtlCol="0" anchor="ctr"/>
+          <a:lstStyle/>
+          <a:p>
+            <a:pPr algn="ctr"/>
+            <a:endParaRPr lang="en-US"/>
+          </a:p>
+        </p:txBody>
+      </p:sp>
+      <p:sp>
+        <p:nvSpPr>
+          <p:cNvPr id="75" name="Oval 74"/>
+          <p:cNvSpPr/>
+          <p:nvPr/>
+        </p:nvSpPr>
+        <p:spPr>
+          <a:xfrm>
+            <a:off x="7457899" y="2245803"/>
+            <a:ext cx="27432" cy="27432"/>
+          </a:xfrm>
+          <a:prstGeom prst="ellipse">
+            <a:avLst/>
+          </a:prstGeom>
+          <a:solidFill>
+            <a:schemeClr val="tx1"/>
+          </a:solidFill>
+          <a:ln>
+            <a:noFill/>
+          </a:ln>
+          <a:effectLst/>
+        </p:spPr>
+        <p:style>
+          <a:lnRef idx="1">
+            <a:schemeClr val="accent1"/>
+          </a:lnRef>
+          <a:fillRef idx="3">
+            <a:schemeClr val="accent1"/>
+          </a:fillRef>
+          <a:effectRef idx="2">
+            <a:schemeClr val="accent1"/>
+          </a:effectRef>
+          <a:fontRef idx="minor">
+            <a:schemeClr val="lt1"/>
+          </a:fontRef>
+        </p:style>
+        <p:txBody>
+          <a:bodyPr rtlCol="0" anchor="ctr"/>
+          <a:lstStyle/>
+          <a:p>
+            <a:pPr algn="ctr"/>
+            <a:endParaRPr lang="en-US"/>
+          </a:p>
+        </p:txBody>
+      </p:sp>
+      <p:sp>
+        <p:nvSpPr>
+          <p:cNvPr id="76" name="Oval 75"/>
+          <p:cNvSpPr/>
+          <p:nvPr/>
+        </p:nvSpPr>
+        <p:spPr>
+          <a:xfrm>
+            <a:off x="7337249" y="2182303"/>
+            <a:ext cx="27432" cy="27432"/>
+          </a:xfrm>
+          <a:prstGeom prst="ellipse">
+            <a:avLst/>
+          </a:prstGeom>
+          <a:solidFill>
+            <a:schemeClr val="tx1"/>
+          </a:solidFill>
+          <a:ln>
+            <a:noFill/>
+          </a:ln>
+          <a:effectLst/>
+        </p:spPr>
+        <p:style>
+          <a:lnRef idx="1">
+            <a:schemeClr val="accent1"/>
+          </a:lnRef>
+          <a:fillRef idx="3">
+            <a:schemeClr val="accent1"/>
+          </a:fillRef>
+          <a:effectRef idx="2">
+            <a:schemeClr val="accent1"/>
+          </a:effectRef>
+          <a:fontRef idx="minor">
+            <a:schemeClr val="lt1"/>
+          </a:fontRef>
+        </p:style>
+        <p:txBody>
+          <a:bodyPr rtlCol="0" anchor="ctr"/>
+          <a:lstStyle/>
+          <a:p>
+            <a:pPr algn="ctr"/>
+            <a:endParaRPr lang="en-US"/>
+          </a:p>
+        </p:txBody>
+      </p:sp>
+      <p:sp>
+        <p:nvSpPr>
+          <p:cNvPr id="77" name="TextBox 76"/>
+          <p:cNvSpPr txBox="1"/>
+          <p:nvPr/>
+        </p:nvSpPr>
+        <p:spPr>
+          <a:xfrm>
+            <a:off x="3304956" y="2670981"/>
+            <a:ext cx="395586" cy="276999"/>
+          </a:xfrm>
+          <a:prstGeom prst="rect">
+            <a:avLst/>
+          </a:prstGeom>
+          <a:noFill/>
+        </p:spPr>
+        <p:txBody>
+          <a:bodyPr wrap="none" rtlCol="0">
+            <a:spAutoFit/>
+          </a:bodyPr>
+          <a:lstStyle>
+            <a:defPPr>
+              <a:defRPr lang="en-US"/>
+            </a:defPPr>
+            <a:lvl1pPr>
+              <a:defRPr sz="1200">
+                <a:latin typeface="Times New Roman"/>
+                <a:cs typeface="Times New Roman"/>
+              </a:defRPr>
+            </a:lvl1pPr>
+          </a:lstStyle>
+          <a:p>
+            <a:r>
+              <a:rPr lang="en-US" b="1" dirty="0" smtClean="0"/>
+              <a:t>H</a:t>
+            </a:r>
+            <a:r>
+              <a:rPr lang="en-US" i="1" baseline="-25000" dirty="0" smtClean="0"/>
+              <a:t>r</a:t>
+            </a:r>
+            <a:r>
+              <a:rPr lang="en-US" baseline="-25000" dirty="0"/>
+              <a:t>1</a:t>
+            </a:r>
+            <a:endParaRPr lang="en-US" dirty="0"/>
+          </a:p>
+        </p:txBody>
+      </p:sp>
+      <p:sp>
+        <p:nvSpPr>
+          <p:cNvPr id="78" name="TextBox 77"/>
+          <p:cNvSpPr txBox="1"/>
+          <p:nvPr/>
+        </p:nvSpPr>
+        <p:spPr>
+          <a:xfrm>
+            <a:off x="3292256" y="3261531"/>
+            <a:ext cx="395586" cy="276999"/>
+          </a:xfrm>
+          <a:prstGeom prst="rect">
+            <a:avLst/>
+          </a:prstGeom>
+          <a:noFill/>
+        </p:spPr>
+        <p:txBody>
+          <a:bodyPr wrap="none" rtlCol="0">
+            <a:spAutoFit/>
+          </a:bodyPr>
+          <a:lstStyle>
+            <a:defPPr>
+              <a:defRPr lang="en-US"/>
+            </a:defPPr>
+            <a:lvl1pPr>
+              <a:defRPr sz="1200">
+                <a:latin typeface="Times New Roman"/>
+                <a:cs typeface="Times New Roman"/>
+              </a:defRPr>
+            </a:lvl1pPr>
+          </a:lstStyle>
+          <a:p>
+            <a:r>
+              <a:rPr lang="en-US" b="1" dirty="0" smtClean="0"/>
+              <a:t>H</a:t>
+            </a:r>
+            <a:r>
+              <a:rPr lang="en-US" i="1" baseline="-25000" dirty="0" smtClean="0"/>
+              <a:t>r</a:t>
+            </a:r>
+            <a:r>
+              <a:rPr lang="en-US" baseline="-25000" dirty="0"/>
+              <a:t>2</a:t>
+            </a:r>
+            <a:endParaRPr lang="en-US" dirty="0"/>
+          </a:p>
+        </p:txBody>
+      </p:sp>
+      <p:sp>
+        <p:nvSpPr>
+          <p:cNvPr id="79" name="TextBox 78"/>
+          <p:cNvSpPr txBox="1"/>
+          <p:nvPr/>
+        </p:nvSpPr>
+        <p:spPr>
+          <a:xfrm>
+            <a:off x="4664132" y="2979576"/>
+            <a:ext cx="400222" cy="276999"/>
+          </a:xfrm>
+          <a:prstGeom prst="rect">
+            <a:avLst/>
+          </a:prstGeom>
+          <a:noFill/>
+        </p:spPr>
+        <p:txBody>
+          <a:bodyPr wrap="none" rtlCol="0">
+            <a:spAutoFit/>
+          </a:bodyPr>
+          <a:lstStyle>
+            <a:defPPr>
+              <a:defRPr lang="en-US"/>
+            </a:defPPr>
+            <a:lvl1pPr>
+              <a:defRPr sz="1200">
+                <a:latin typeface="Times New Roman"/>
+                <a:cs typeface="Times New Roman"/>
+              </a:defRPr>
+            </a:lvl1pPr>
+          </a:lstStyle>
+          <a:p>
+            <a:r>
+              <a:rPr lang="en-US" b="1" dirty="0" err="1" smtClean="0"/>
+              <a:t>H</a:t>
+            </a:r>
+            <a:r>
+              <a:rPr lang="en-US" i="1" baseline="-25000" dirty="0" err="1" smtClean="0"/>
+              <a:t>rl</a:t>
+            </a:r>
+            <a:endParaRPr lang="en-US" i="1" dirty="0"/>
+          </a:p>
+        </p:txBody>
+      </p:sp>
+      <p:sp>
+        <p:nvSpPr>
+          <p:cNvPr id="81" name="TextBox 80"/>
+          <p:cNvSpPr txBox="1"/>
+          <p:nvPr/>
+        </p:nvSpPr>
+        <p:spPr>
+          <a:xfrm>
+            <a:off x="4765456" y="2245531"/>
+            <a:ext cx="440147" cy="276999"/>
+          </a:xfrm>
+          <a:prstGeom prst="rect">
+            <a:avLst/>
+          </a:prstGeom>
+          <a:noFill/>
+        </p:spPr>
+        <p:txBody>
+          <a:bodyPr wrap="none" rtlCol="0">
+            <a:spAutoFit/>
+          </a:bodyPr>
+          <a:lstStyle>
+            <a:defPPr>
+              <a:defRPr lang="en-US"/>
+            </a:defPPr>
+            <a:lvl1pPr>
+              <a:defRPr sz="1200">
+                <a:latin typeface="Times New Roman"/>
+                <a:cs typeface="Times New Roman"/>
+              </a:defRPr>
+            </a:lvl1pPr>
+          </a:lstStyle>
+          <a:p>
+            <a:r>
+              <a:rPr lang="en-US" b="1" dirty="0" err="1" smtClean="0"/>
+              <a:t>H</a:t>
+            </a:r>
+            <a:r>
+              <a:rPr lang="en-US" i="1" baseline="-25000" dirty="0" err="1"/>
+              <a:t>r</a:t>
+            </a:r>
+            <a:r>
+              <a:rPr lang="en-US" i="1" baseline="-25000" dirty="0" err="1" smtClean="0"/>
+              <a:t>N</a:t>
+            </a:r>
+            <a:endParaRPr lang="en-US" i="1" dirty="0"/>
+          </a:p>
+        </p:txBody>
+      </p:sp>
+      <p:grpSp>
+        <p:nvGrpSpPr>
+          <p:cNvPr id="57" name="Group 56"/>
+          <p:cNvGrpSpPr/>
+          <p:nvPr/>
+        </p:nvGrpSpPr>
+        <p:grpSpPr>
+          <a:xfrm>
+            <a:off x="5507323" y="3316722"/>
+            <a:ext cx="180763" cy="276999"/>
+            <a:chOff x="2133071" y="1574382"/>
+            <a:chExt cx="180763" cy="276999"/>
+          </a:xfrm>
+        </p:grpSpPr>
+        <p:sp>
+          <p:nvSpPr>
+            <p:cNvPr id="59" name="TextBox 58"/>
+            <p:cNvSpPr txBox="1"/>
+            <p:nvPr/>
+          </p:nvSpPr>
+          <p:spPr>
+            <a:xfrm>
+              <a:off x="2204030" y="1574382"/>
+              <a:ext cx="76944" cy="276999"/>
+            </a:xfrm>
+            <a:prstGeom prst="rect">
+              <a:avLst/>
+            </a:prstGeom>
+            <a:noFill/>
+          </p:spPr>
+          <p:txBody>
+            <a:bodyPr wrap="none" lIns="0" tIns="0" rIns="0" bIns="0" rtlCol="0" anchor="ctr" anchorCtr="0">
+              <a:noAutofit/>
+            </a:bodyPr>
+            <a:lstStyle/>
+            <a:p>
+              <a:pPr algn="ctr"/>
+              <a:r>
+                <a:rPr lang="en-US" sz="1200" i="1" dirty="0">
+                  <a:latin typeface="Times New Roman"/>
+                  <a:cs typeface="Times New Roman"/>
+                </a:rPr>
+                <a:t>l</a:t>
+              </a:r>
+              <a:endParaRPr lang="en-US" sz="1200" i="1" dirty="0">
+                <a:latin typeface="Times New Roman"/>
+                <a:cs typeface="Times New Roman"/>
+              </a:endParaRPr>
+            </a:p>
+          </p:txBody>
+        </p:sp>
+        <p:sp>
+          <p:nvSpPr>
+            <p:cNvPr id="60" name="Oval 59"/>
+            <p:cNvSpPr>
+              <a:spLocks/>
+            </p:cNvSpPr>
+            <p:nvPr/>
+          </p:nvSpPr>
+          <p:spPr>
+            <a:xfrm>
+              <a:off x="2133071" y="1640491"/>
+              <a:ext cx="180763" cy="182880"/>
+            </a:xfrm>
+            <a:prstGeom prst="ellipse">
+              <a:avLst/>
+            </a:prstGeom>
+            <a:noFill/>
+            <a:ln>
+              <a:solidFill>
+                <a:schemeClr val="tx1"/>
+              </a:solidFill>
+            </a:ln>
+            <a:effectLst/>
+          </p:spPr>
+          <p:style>
+            <a:lnRef idx="1">
+              <a:schemeClr val="accent1"/>
+            </a:lnRef>
+            <a:fillRef idx="3">
+              <a:schemeClr val="accent1"/>
+            </a:fillRef>
+            <a:effectRef idx="2">
+              <a:schemeClr val="accent1"/>
+            </a:effectRef>
+            <a:fontRef idx="minor">
+              <a:schemeClr val="lt1"/>
+            </a:fontRef>
+          </p:style>
+          <p:txBody>
+            <a:bodyPr rtlCol="0" anchor="ctr"/>
+            <a:lstStyle/>
+            <a:p>
+              <a:pPr algn="ctr"/>
+              <a:endParaRPr lang="en-US"/>
+            </a:p>
+          </p:txBody>
+        </p:sp>
+      </p:grpSp>
+      <p:sp>
+        <p:nvSpPr>
+          <p:cNvPr id="22" name="Oval 21"/>
+          <p:cNvSpPr/>
+          <p:nvPr/>
+        </p:nvSpPr>
+        <p:spPr>
+          <a:xfrm rot="19956132">
+            <a:off x="4065955" y="3562161"/>
+            <a:ext cx="1855438" cy="419472"/>
+          </a:xfrm>
+          <a:prstGeom prst="ellipse">
+            <a:avLst/>
+          </a:prstGeom>
+          <a:noFill/>
+        </p:spPr>
+        <p:style>
+          <a:lnRef idx="1">
+            <a:schemeClr val="accent1"/>
+          </a:lnRef>
+          <a:fillRef idx="3">
+            <a:schemeClr val="accent1"/>
+          </a:fillRef>
+          <a:effectRef idx="2">
+            <a:schemeClr val="accent1"/>
+          </a:effectRef>
+          <a:fontRef idx="minor">
+            <a:schemeClr val="lt1"/>
+          </a:fontRef>
+        </p:style>
+        <p:txBody>
+          <a:bodyPr rtlCol="0" anchor="ctr"/>
+          <a:lstStyle/>
+          <a:p>
+            <a:pPr algn="ctr"/>
+            <a:endParaRPr lang="en-US"/>
+          </a:p>
+        </p:txBody>
+      </p:sp>
+      <p:grpSp>
+        <p:nvGrpSpPr>
+          <p:cNvPr id="62" name="Group 61"/>
+          <p:cNvGrpSpPr/>
+          <p:nvPr/>
+        </p:nvGrpSpPr>
+        <p:grpSpPr>
+          <a:xfrm>
+            <a:off x="5474463" y="2520658"/>
+            <a:ext cx="180763" cy="276999"/>
+            <a:chOff x="2133071" y="1568032"/>
+            <a:chExt cx="180763" cy="276999"/>
+          </a:xfrm>
+        </p:grpSpPr>
+        <p:sp>
+          <p:nvSpPr>
+            <p:cNvPr id="63" name="TextBox 62"/>
+            <p:cNvSpPr txBox="1"/>
+            <p:nvPr/>
+          </p:nvSpPr>
+          <p:spPr>
+            <a:xfrm>
+              <a:off x="2197680" y="1568032"/>
+              <a:ext cx="76944" cy="276999"/>
+            </a:xfrm>
+            <a:prstGeom prst="rect">
+              <a:avLst/>
+            </a:prstGeom>
+            <a:noFill/>
+          </p:spPr>
+          <p:txBody>
+            <a:bodyPr wrap="none" lIns="0" tIns="0" rIns="0" bIns="0" rtlCol="0" anchor="ctr" anchorCtr="0">
+              <a:noAutofit/>
+            </a:bodyPr>
+            <a:lstStyle/>
+            <a:p>
+              <a:pPr algn="ctr"/>
+              <a:r>
+                <a:rPr lang="en-US" sz="1200" i="1" dirty="0">
+                  <a:latin typeface="Times New Roman"/>
+                  <a:cs typeface="Times New Roman"/>
+                </a:rPr>
+                <a:t>m</a:t>
+              </a:r>
+            </a:p>
+          </p:txBody>
+        </p:sp>
+        <p:sp>
+          <p:nvSpPr>
+            <p:cNvPr id="64" name="Oval 63"/>
+            <p:cNvSpPr>
+              <a:spLocks/>
+            </p:cNvSpPr>
+            <p:nvPr/>
+          </p:nvSpPr>
+          <p:spPr>
+            <a:xfrm>
+              <a:off x="2133071" y="1640491"/>
+              <a:ext cx="180763" cy="182880"/>
+            </a:xfrm>
+            <a:prstGeom prst="ellipse">
+              <a:avLst/>
+            </a:prstGeom>
+            <a:noFill/>
+            <a:ln>
+              <a:solidFill>
+                <a:schemeClr val="tx1"/>
+              </a:solidFill>
+            </a:ln>
+            <a:effectLst/>
+          </p:spPr>
+          <p:style>
+            <a:lnRef idx="1">
+              <a:schemeClr val="accent1"/>
+            </a:lnRef>
+            <a:fillRef idx="3">
+              <a:schemeClr val="accent1"/>
+            </a:fillRef>
+            <a:effectRef idx="2">
+              <a:schemeClr val="accent1"/>
+            </a:effectRef>
+            <a:fontRef idx="minor">
+              <a:schemeClr val="lt1"/>
+            </a:fontRef>
+          </p:style>
+          <p:txBody>
+            <a:bodyPr rtlCol="0" anchor="ctr"/>
+            <a:lstStyle/>
+            <a:p>
+              <a:pPr algn="ctr"/>
+              <a:endParaRPr lang="en-US"/>
+            </a:p>
+          </p:txBody>
+        </p:sp>
+      </p:grpSp>
+      <p:sp>
+        <p:nvSpPr>
+          <p:cNvPr id="65" name="Oval 64"/>
+          <p:cNvSpPr/>
+          <p:nvPr/>
+        </p:nvSpPr>
+        <p:spPr>
+          <a:xfrm rot="4236325">
+            <a:off x="2289969" y="2957475"/>
+            <a:ext cx="1490501" cy="419472"/>
+          </a:xfrm>
+          <a:prstGeom prst="ellipse">
+            <a:avLst/>
+          </a:prstGeom>
+          <a:noFill/>
+        </p:spPr>
+        <p:style>
+          <a:lnRef idx="1">
+            <a:schemeClr val="accent1"/>
+          </a:lnRef>
+          <a:fillRef idx="3">
+            <a:schemeClr val="accent1"/>
+          </a:fillRef>
+          <a:effectRef idx="2">
+            <a:schemeClr val="accent1"/>
+          </a:effectRef>
+          <a:fontRef idx="minor">
+            <a:schemeClr val="lt1"/>
+          </a:fontRef>
+        </p:style>
+        <p:txBody>
+          <a:bodyPr rtlCol="0" anchor="ctr"/>
+          <a:lstStyle/>
+          <a:p>
+            <a:pPr algn="ctr"/>
+            <a:endParaRPr lang="en-US"/>
+          </a:p>
+        </p:txBody>
+      </p:sp>
+      <p:sp>
+        <p:nvSpPr>
+          <p:cNvPr id="66" name="Oval 65"/>
+          <p:cNvSpPr/>
+          <p:nvPr/>
+        </p:nvSpPr>
+        <p:spPr>
+          <a:xfrm rot="5178686">
+            <a:off x="4925055" y="2855513"/>
+            <a:ext cx="1320241" cy="419472"/>
+          </a:xfrm>
+          <a:prstGeom prst="ellipse">
+            <a:avLst/>
+          </a:prstGeom>
+          <a:noFill/>
+          <a:ln>
+            <a:prstDash val="dash"/>
+          </a:ln>
+        </p:spPr>
+        <p:style>
+          <a:lnRef idx="1">
+            <a:schemeClr val="accent1"/>
+          </a:lnRef>
+          <a:fillRef idx="3">
+            <a:schemeClr val="accent1"/>
+          </a:fillRef>
+          <a:effectRef idx="2">
+            <a:schemeClr val="accent1"/>
+          </a:effectRef>
+          <a:fontRef idx="minor">
+            <a:schemeClr val="lt1"/>
+          </a:fontRef>
+        </p:style>
+        <p:txBody>
+          <a:bodyPr rtlCol="0" anchor="ctr"/>
+          <a:lstStyle/>
+          <a:p>
+            <a:pPr algn="ctr"/>
+            <a:endParaRPr lang="en-US"/>
+          </a:p>
+        </p:txBody>
+      </p:sp>
+      <p:cxnSp>
+        <p:nvCxnSpPr>
+          <p:cNvPr id="27" name="Straight Arrow Connector 26"/>
+          <p:cNvCxnSpPr>
+            <a:stCxn id="60" idx="3"/>
+            <a:endCxn id="44" idx="6"/>
+          </p:cNvCxnSpPr>
+          <p:nvPr/>
+        </p:nvCxnSpPr>
+        <p:spPr>
+          <a:xfrm flipH="1">
+            <a:off x="4461395" y="3538929"/>
+            <a:ext cx="1072400" cy="566223"/>
+          </a:xfrm>
+          <a:prstGeom prst="straightConnector1">
+            <a:avLst/>
+          </a:prstGeom>
+          <a:ln w="12700" cmpd="sng">
+            <a:solidFill>
+              <a:schemeClr val="tx1"/>
+            </a:solidFill>
+            <a:prstDash val="sysDash"/>
+            <a:tailEnd type="stealth" w="lg" len="lg"/>
+          </a:ln>
+          <a:effectLst/>
+        </p:spPr>
+        <p:style>
+          <a:lnRef idx="2">
+            <a:schemeClr val="accent1"/>
+          </a:lnRef>
+          <a:fillRef idx="0">
+            <a:schemeClr val="accent1"/>
+          </a:fillRef>
+          <a:effectRef idx="1">
+            <a:schemeClr val="accent1"/>
+          </a:effectRef>
+          <a:fontRef idx="minor">
+            <a:schemeClr val="tx1"/>
+          </a:fontRef>
+        </p:style>
+      </p:cxnSp>
+      <p:cxnSp>
+        <p:nvCxnSpPr>
+          <p:cNvPr id="30" name="Straight Arrow Connector 29"/>
+          <p:cNvCxnSpPr>
+            <a:stCxn id="22" idx="0"/>
+            <a:endCxn id="37" idx="5"/>
+          </p:cNvCxnSpPr>
+          <p:nvPr/>
+        </p:nvCxnSpPr>
+        <p:spPr>
+          <a:xfrm flipH="1" flipV="1">
+            <a:off x="4241461" y="3103994"/>
+            <a:ext cx="655700" cy="481692"/>
+          </a:xfrm>
+          <a:prstGeom prst="straightConnector1">
+            <a:avLst/>
+          </a:prstGeom>
+          <a:ln w="22225" cmpd="dbl">
+            <a:solidFill>
+              <a:schemeClr val="accent4"/>
+            </a:solidFill>
+            <a:prstDash val="solid"/>
+            <a:tailEnd type="triangle" w="lg" len="med"/>
+          </a:ln>
+          <a:effectLst/>
+        </p:spPr>
+        <p:style>
+          <a:lnRef idx="2">
+            <a:schemeClr val="accent1"/>
+          </a:lnRef>
+          <a:fillRef idx="0">
+            <a:schemeClr val="accent1"/>
+          </a:fillRef>
+          <a:effectRef idx="1">
+            <a:schemeClr val="accent1"/>
+          </a:effectRef>
+          <a:fontRef idx="minor">
+            <a:schemeClr val="tx1"/>
+          </a:fontRef>
+        </p:style>
+      </p:cxnSp>
+      <p:cxnSp>
+        <p:nvCxnSpPr>
+          <p:cNvPr id="53" name="Straight Arrow Connector 52"/>
+          <p:cNvCxnSpPr>
+            <a:stCxn id="22" idx="4"/>
+            <a:endCxn id="47" idx="2"/>
+          </p:cNvCxnSpPr>
+          <p:nvPr/>
+        </p:nvCxnSpPr>
+        <p:spPr>
+          <a:xfrm>
+            <a:off x="5090187" y="3958108"/>
+            <a:ext cx="656376" cy="109363"/>
+          </a:xfrm>
+          <a:prstGeom prst="straightConnector1">
+            <a:avLst/>
+          </a:prstGeom>
+          <a:ln w="22225" cmpd="dbl">
+            <a:solidFill>
+              <a:schemeClr val="accent4"/>
+            </a:solidFill>
+            <a:prstDash val="solid"/>
+            <a:tailEnd type="triangle" w="lg" len="med"/>
+          </a:ln>
+          <a:effectLst/>
+        </p:spPr>
+        <p:style>
+          <a:lnRef idx="2">
+            <a:schemeClr val="accent1"/>
+          </a:lnRef>
+          <a:fillRef idx="0">
+            <a:schemeClr val="accent1"/>
+          </a:fillRef>
+          <a:effectRef idx="1">
+            <a:schemeClr val="accent1"/>
+          </a:effectRef>
+          <a:fontRef idx="minor">
+            <a:schemeClr val="tx1"/>
+          </a:fontRef>
+        </p:style>
+      </p:cxnSp>
+      <p:grpSp>
+        <p:nvGrpSpPr>
+          <p:cNvPr id="54" name="Group 53"/>
+          <p:cNvGrpSpPr/>
+          <p:nvPr/>
+        </p:nvGrpSpPr>
+        <p:grpSpPr>
+          <a:xfrm>
+            <a:off x="5149619" y="3964336"/>
+            <a:ext cx="387429" cy="316634"/>
+            <a:chOff x="5105169" y="4008786"/>
+            <a:chExt cx="387429" cy="316634"/>
+          </a:xfrm>
+        </p:grpSpPr>
+        <p:sp>
+          <p:nvSpPr>
+            <p:cNvPr id="80" name="TextBox 79"/>
+            <p:cNvSpPr txBox="1"/>
+            <p:nvPr/>
+          </p:nvSpPr>
+          <p:spPr>
+            <a:xfrm>
+              <a:off x="5105169" y="4048421"/>
+              <a:ext cx="363103" cy="276999"/>
+            </a:xfrm>
+            <a:prstGeom prst="rect">
+              <a:avLst/>
+            </a:prstGeom>
+            <a:noFill/>
+          </p:spPr>
+          <p:txBody>
+            <a:bodyPr wrap="none" rtlCol="0">
+              <a:spAutoFit/>
+            </a:bodyPr>
+            <a:lstStyle>
+              <a:defPPr>
+                <a:defRPr lang="en-US"/>
+              </a:defPPr>
+              <a:lvl1pPr>
+                <a:defRPr sz="1200">
+                  <a:latin typeface="Times New Roman"/>
+                  <a:cs typeface="Times New Roman"/>
+                </a:defRPr>
+              </a:lvl1pPr>
+            </a:lstStyle>
+            <a:p>
+              <a:r>
+                <a:rPr lang="en-US" b="1" dirty="0" err="1" smtClean="0"/>
+                <a:t>P</a:t>
+              </a:r>
+              <a:r>
+                <a:rPr lang="en-US" baseline="-25000" dirty="0" err="1" smtClean="0"/>
+                <a:t>j</a:t>
+              </a:r>
+              <a:r>
+                <a:rPr lang="en-US" i="1" baseline="-25000" dirty="0" err="1" smtClean="0"/>
+                <a:t>l</a:t>
+              </a:r>
+              <a:endParaRPr lang="en-US" i="1" dirty="0"/>
+            </a:p>
+          </p:txBody>
+        </p:sp>
+        <p:sp>
+          <p:nvSpPr>
+            <p:cNvPr id="82" name="TextBox 81"/>
+            <p:cNvSpPr txBox="1"/>
+            <p:nvPr/>
+          </p:nvSpPr>
+          <p:spPr>
+            <a:xfrm>
+              <a:off x="5194069" y="4008786"/>
+              <a:ext cx="298529" cy="215444"/>
+            </a:xfrm>
+            <a:prstGeom prst="rect">
+              <a:avLst/>
+            </a:prstGeom>
+            <a:noFill/>
+          </p:spPr>
+          <p:txBody>
+            <a:bodyPr wrap="none" rtlCol="0">
+              <a:spAutoFit/>
+            </a:bodyPr>
+            <a:lstStyle/>
+            <a:p>
+              <a:r>
+                <a:rPr lang="en-US" sz="800" dirty="0" smtClean="0">
+                  <a:latin typeface="Times New Roman"/>
+                  <a:cs typeface="Times New Roman"/>
+                </a:rPr>
+                <a:t>[</a:t>
+              </a:r>
+              <a:r>
+                <a:rPr lang="en-US" sz="800" i="1" dirty="0" smtClean="0">
+                  <a:latin typeface="Times New Roman"/>
+                  <a:cs typeface="Times New Roman"/>
+                </a:rPr>
+                <a:t>k</a:t>
+              </a:r>
+              <a:r>
+                <a:rPr lang="en-US" sz="800" dirty="0" smtClean="0">
+                  <a:latin typeface="Times New Roman"/>
+                  <a:cs typeface="Times New Roman"/>
+                </a:rPr>
+                <a:t>]</a:t>
+              </a:r>
+              <a:endParaRPr lang="en-US" sz="800" dirty="0">
+                <a:latin typeface="Times New Roman"/>
+                <a:cs typeface="Times New Roman"/>
+              </a:endParaRPr>
+            </a:p>
+          </p:txBody>
+        </p:sp>
+      </p:grpSp>
+      <p:grpSp>
+        <p:nvGrpSpPr>
+          <p:cNvPr id="83" name="Group 82"/>
+          <p:cNvGrpSpPr/>
+          <p:nvPr/>
+        </p:nvGrpSpPr>
+        <p:grpSpPr>
+          <a:xfrm>
+            <a:off x="4222411" y="3250225"/>
+            <a:ext cx="381819" cy="316634"/>
+            <a:chOff x="5105169" y="4008786"/>
+            <a:chExt cx="381819" cy="316634"/>
+          </a:xfrm>
+        </p:grpSpPr>
+        <p:sp>
+          <p:nvSpPr>
+            <p:cNvPr id="84" name="TextBox 83"/>
+            <p:cNvSpPr txBox="1"/>
+            <p:nvPr/>
+          </p:nvSpPr>
+          <p:spPr>
+            <a:xfrm>
+              <a:off x="5105169" y="4048421"/>
+              <a:ext cx="363103" cy="276999"/>
+            </a:xfrm>
+            <a:prstGeom prst="rect">
+              <a:avLst/>
+            </a:prstGeom>
+            <a:noFill/>
+          </p:spPr>
+          <p:txBody>
+            <a:bodyPr wrap="none" rtlCol="0">
+              <a:spAutoFit/>
+            </a:bodyPr>
+            <a:lstStyle>
+              <a:defPPr>
+                <a:defRPr lang="en-US"/>
+              </a:defPPr>
+              <a:lvl1pPr>
+                <a:defRPr sz="1200">
+                  <a:latin typeface="Times New Roman"/>
+                  <a:cs typeface="Times New Roman"/>
+                </a:defRPr>
+              </a:lvl1pPr>
+            </a:lstStyle>
+            <a:p>
+              <a:r>
+                <a:rPr lang="en-US" b="1" dirty="0" err="1" smtClean="0"/>
+                <a:t>P</a:t>
+              </a:r>
+              <a:r>
+                <a:rPr lang="en-US" baseline="-25000" dirty="0" err="1" smtClean="0"/>
+                <a:t>j</a:t>
+              </a:r>
+              <a:r>
+                <a:rPr lang="en-US" i="1" baseline="-25000" dirty="0" err="1" smtClean="0"/>
+                <a:t>l</a:t>
+              </a:r>
+              <a:endParaRPr lang="en-US" i="1" dirty="0"/>
+            </a:p>
+          </p:txBody>
+        </p:sp>
+        <p:sp>
+          <p:nvSpPr>
+            <p:cNvPr id="85" name="TextBox 84"/>
+            <p:cNvSpPr txBox="1"/>
+            <p:nvPr/>
+          </p:nvSpPr>
+          <p:spPr>
+            <a:xfrm>
+              <a:off x="5194069" y="4008786"/>
+              <a:ext cx="292919" cy="215444"/>
+            </a:xfrm>
+            <a:prstGeom prst="rect">
+              <a:avLst/>
+            </a:prstGeom>
+            <a:noFill/>
+          </p:spPr>
+          <p:txBody>
+            <a:bodyPr wrap="none" rtlCol="0">
+              <a:spAutoFit/>
+            </a:bodyPr>
+            <a:lstStyle/>
+            <a:p>
+              <a:r>
+                <a:rPr lang="en-US" sz="800" dirty="0" smtClean="0">
+                  <a:latin typeface="Times New Roman"/>
+                  <a:cs typeface="Times New Roman"/>
+                </a:rPr>
+                <a:t>[</a:t>
+              </a:r>
+              <a:r>
+                <a:rPr lang="en-US" sz="800" i="1" dirty="0">
+                  <a:latin typeface="Times New Roman"/>
+                  <a:cs typeface="Times New Roman"/>
+                </a:rPr>
+                <a:t>r</a:t>
+              </a:r>
+              <a:r>
+                <a:rPr lang="en-US" sz="800" dirty="0" smtClean="0">
+                  <a:latin typeface="Times New Roman"/>
+                  <a:cs typeface="Times New Roman"/>
+                </a:rPr>
+                <a:t>]</a:t>
+              </a:r>
+              <a:endParaRPr lang="en-US" sz="800" dirty="0">
+                <a:latin typeface="Times New Roman"/>
+                <a:cs typeface="Times New Roman"/>
+              </a:endParaRPr>
+            </a:p>
+          </p:txBody>
+        </p:sp>
+      </p:grpSp>
+    </p:spTree>
+    <p:extLst>
+      <p:ext uri="{BB962C8B-B14F-4D97-AF65-F5344CB8AC3E}">
+        <p14:creationId xmlns:p14="http://schemas.microsoft.com/office/powerpoint/2010/main" val="437684851"/>
+      </p:ext>
+    </p:extLst>
+  </p:cSld>
+  <p:clrMapOvr>
+    <a:masterClrMapping/>
+  </p:clrMapOvr>
+  <p:timing>
+    <p:tnLst>
+      <p:par>
+        <p:cTn xmlns:p14="http://schemas.microsoft.com/office/powerpoint/2010/main" id="1" dur="indefinite" restart="never" nodeType="tmRoot"/>
+      </p:par>
+    </p:tnLst>
+  </p:timing>
 </p:sld>
 </file>
 

</xml_diff>

<commit_message>
The final submitted draft.
</commit_message>
<xml_diff>
--- a/p_A15-020/p_A15-020_figures.pptx
+++ b/p_A15-020/p_A15-020_figures.pptx
@@ -7,6 +7,7 @@
   <p:sldIdLst>
     <p:sldId id="257" r:id="rId2"/>
     <p:sldId id="258" r:id="rId3"/>
+    <p:sldId id="259" r:id="rId4"/>
   </p:sldIdLst>
   <p:sldSz cx="9144000" cy="6858000" type="screen4x3"/>
   <p:notesSz cx="6858000" cy="9144000"/>
@@ -289,7 +290,7 @@
           <a:p>
             <a:fld id="{FBB2469B-1D9F-7E48-AD20-EE6513EB9BA2}" type="datetimeFigureOut">
               <a:rPr lang="en-US" smtClean="0"/>
-              <a:t>2/20/15</a:t>
+              <a:t>2/24/15</a:t>
             </a:fld>
             <a:endParaRPr lang="en-US"/>
           </a:p>
@@ -459,7 +460,7 @@
           <a:p>
             <a:fld id="{FBB2469B-1D9F-7E48-AD20-EE6513EB9BA2}" type="datetimeFigureOut">
               <a:rPr lang="en-US" smtClean="0"/>
-              <a:t>2/20/15</a:t>
+              <a:t>2/24/15</a:t>
             </a:fld>
             <a:endParaRPr lang="en-US"/>
           </a:p>
@@ -639,7 +640,7 @@
           <a:p>
             <a:fld id="{FBB2469B-1D9F-7E48-AD20-EE6513EB9BA2}" type="datetimeFigureOut">
               <a:rPr lang="en-US" smtClean="0"/>
-              <a:t>2/20/15</a:t>
+              <a:t>2/24/15</a:t>
             </a:fld>
             <a:endParaRPr lang="en-US"/>
           </a:p>
@@ -809,7 +810,7 @@
           <a:p>
             <a:fld id="{FBB2469B-1D9F-7E48-AD20-EE6513EB9BA2}" type="datetimeFigureOut">
               <a:rPr lang="en-US" smtClean="0"/>
-              <a:t>2/20/15</a:t>
+              <a:t>2/24/15</a:t>
             </a:fld>
             <a:endParaRPr lang="en-US"/>
           </a:p>
@@ -1055,7 +1056,7 @@
           <a:p>
             <a:fld id="{FBB2469B-1D9F-7E48-AD20-EE6513EB9BA2}" type="datetimeFigureOut">
               <a:rPr lang="en-US" smtClean="0"/>
-              <a:t>2/20/15</a:t>
+              <a:t>2/24/15</a:t>
             </a:fld>
             <a:endParaRPr lang="en-US"/>
           </a:p>
@@ -1343,7 +1344,7 @@
           <a:p>
             <a:fld id="{FBB2469B-1D9F-7E48-AD20-EE6513EB9BA2}" type="datetimeFigureOut">
               <a:rPr lang="en-US" smtClean="0"/>
-              <a:t>2/20/15</a:t>
+              <a:t>2/24/15</a:t>
             </a:fld>
             <a:endParaRPr lang="en-US"/>
           </a:p>
@@ -1765,7 +1766,7 @@
           <a:p>
             <a:fld id="{FBB2469B-1D9F-7E48-AD20-EE6513EB9BA2}" type="datetimeFigureOut">
               <a:rPr lang="en-US" smtClean="0"/>
-              <a:t>2/20/15</a:t>
+              <a:t>2/24/15</a:t>
             </a:fld>
             <a:endParaRPr lang="en-US"/>
           </a:p>
@@ -1883,7 +1884,7 @@
           <a:p>
             <a:fld id="{FBB2469B-1D9F-7E48-AD20-EE6513EB9BA2}" type="datetimeFigureOut">
               <a:rPr lang="en-US" smtClean="0"/>
-              <a:t>2/20/15</a:t>
+              <a:t>2/24/15</a:t>
             </a:fld>
             <a:endParaRPr lang="en-US"/>
           </a:p>
@@ -1978,7 +1979,7 @@
           <a:p>
             <a:fld id="{FBB2469B-1D9F-7E48-AD20-EE6513EB9BA2}" type="datetimeFigureOut">
               <a:rPr lang="en-US" smtClean="0"/>
-              <a:t>2/20/15</a:t>
+              <a:t>2/24/15</a:t>
             </a:fld>
             <a:endParaRPr lang="en-US"/>
           </a:p>
@@ -2255,7 +2256,7 @@
           <a:p>
             <a:fld id="{FBB2469B-1D9F-7E48-AD20-EE6513EB9BA2}" type="datetimeFigureOut">
               <a:rPr lang="en-US" smtClean="0"/>
-              <a:t>2/20/15</a:t>
+              <a:t>2/24/15</a:t>
             </a:fld>
             <a:endParaRPr lang="en-US"/>
           </a:p>
@@ -2508,7 +2509,7 @@
           <a:p>
             <a:fld id="{FBB2469B-1D9F-7E48-AD20-EE6513EB9BA2}" type="datetimeFigureOut">
               <a:rPr lang="en-US" smtClean="0"/>
-              <a:t>2/20/15</a:t>
+              <a:t>2/24/15</a:t>
             </a:fld>
             <a:endParaRPr lang="en-US"/>
           </a:p>
@@ -2721,7 +2722,7 @@
           <a:p>
             <a:fld id="{FBB2469B-1D9F-7E48-AD20-EE6513EB9BA2}" type="datetimeFigureOut">
               <a:rPr lang="en-US" smtClean="0"/>
-              <a:t>2/20/15</a:t>
+              <a:t>2/24/15</a:t>
             </a:fld>
             <a:endParaRPr lang="en-US"/>
           </a:p>
@@ -6875,6 +6876,2696 @@
     <p:extLst>
       <p:ext uri="{BB962C8B-B14F-4D97-AF65-F5344CB8AC3E}">
         <p14:creationId xmlns:p14="http://schemas.microsoft.com/office/powerpoint/2010/main" val="437684851"/>
+      </p:ext>
+    </p:extLst>
+  </p:cSld>
+  <p:clrMapOvr>
+    <a:masterClrMapping/>
+  </p:clrMapOvr>
+  <p:timing>
+    <p:tnLst>
+      <p:par>
+        <p:cTn xmlns:p14="http://schemas.microsoft.com/office/powerpoint/2010/main" id="1" dur="indefinite" restart="never" nodeType="tmRoot"/>
+      </p:par>
+    </p:tnLst>
+  </p:timing>
+</p:sld>
+</file>
+
+<file path=ppt/slides/slide3.xml><?xml version="1.0" encoding="utf-8"?>
+<p:sld xmlns:a="http://schemas.openxmlformats.org/drawingml/2006/main" xmlns:r="http://schemas.openxmlformats.org/officeDocument/2006/relationships" xmlns:p="http://schemas.openxmlformats.org/presentationml/2006/main">
+  <p:cSld>
+    <p:spTree>
+      <p:nvGrpSpPr>
+        <p:cNvPr id="1" name=""/>
+        <p:cNvGrpSpPr/>
+        <p:nvPr/>
+      </p:nvGrpSpPr>
+      <p:grpSpPr>
+        <a:xfrm>
+          <a:off x="0" y="0"/>
+          <a:ext cx="0" cy="0"/>
+          <a:chOff x="0" y="0"/>
+          <a:chExt cx="0" cy="0"/>
+        </a:xfrm>
+      </p:grpSpPr>
+      <p:sp>
+        <p:nvSpPr>
+          <p:cNvPr id="4" name="Rectangle 3"/>
+          <p:cNvSpPr/>
+          <p:nvPr/>
+        </p:nvSpPr>
+        <p:spPr>
+          <a:xfrm>
+            <a:off x="2442415" y="3149600"/>
+            <a:ext cx="228600" cy="374650"/>
+          </a:xfrm>
+          <a:prstGeom prst="rect">
+            <a:avLst/>
+          </a:prstGeom>
+          <a:noFill/>
+          <a:ln>
+            <a:solidFill>
+              <a:schemeClr val="tx1"/>
+            </a:solidFill>
+          </a:ln>
+          <a:effectLst/>
+        </p:spPr>
+        <p:style>
+          <a:lnRef idx="1">
+            <a:schemeClr val="accent1"/>
+          </a:lnRef>
+          <a:fillRef idx="3">
+            <a:schemeClr val="accent1"/>
+          </a:fillRef>
+          <a:effectRef idx="2">
+            <a:schemeClr val="accent1"/>
+          </a:effectRef>
+          <a:fontRef idx="minor">
+            <a:schemeClr val="lt1"/>
+          </a:fontRef>
+        </p:style>
+        <p:txBody>
+          <a:bodyPr rtlCol="0" anchor="ctr"/>
+          <a:lstStyle/>
+          <a:p>
+            <a:pPr algn="ctr"/>
+            <a:endParaRPr lang="en-US"/>
+          </a:p>
+        </p:txBody>
+      </p:sp>
+      <p:sp>
+        <p:nvSpPr>
+          <p:cNvPr id="5" name="Rectangle 4"/>
+          <p:cNvSpPr/>
+          <p:nvPr/>
+        </p:nvSpPr>
+        <p:spPr>
+          <a:xfrm>
+            <a:off x="2213815" y="3149600"/>
+            <a:ext cx="228600" cy="374650"/>
+          </a:xfrm>
+          <a:prstGeom prst="rect">
+            <a:avLst/>
+          </a:prstGeom>
+          <a:solidFill>
+            <a:schemeClr val="accent3"/>
+          </a:solidFill>
+          <a:ln>
+            <a:solidFill>
+              <a:schemeClr val="tx1"/>
+            </a:solidFill>
+          </a:ln>
+          <a:effectLst/>
+        </p:spPr>
+        <p:style>
+          <a:lnRef idx="1">
+            <a:schemeClr val="accent1"/>
+          </a:lnRef>
+          <a:fillRef idx="3">
+            <a:schemeClr val="accent1"/>
+          </a:fillRef>
+          <a:effectRef idx="2">
+            <a:schemeClr val="accent1"/>
+          </a:effectRef>
+          <a:fontRef idx="minor">
+            <a:schemeClr val="lt1"/>
+          </a:fontRef>
+        </p:style>
+        <p:txBody>
+          <a:bodyPr rtlCol="0" anchor="ctr"/>
+          <a:lstStyle/>
+          <a:p>
+            <a:pPr algn="ctr"/>
+            <a:endParaRPr lang="en-US" sz="1200">
+              <a:latin typeface="Arial"/>
+              <a:cs typeface="Arial"/>
+            </a:endParaRPr>
+          </a:p>
+        </p:txBody>
+      </p:sp>
+      <p:sp>
+        <p:nvSpPr>
+          <p:cNvPr id="6" name="Rectangle 5"/>
+          <p:cNvSpPr/>
+          <p:nvPr/>
+        </p:nvSpPr>
+        <p:spPr>
+          <a:xfrm>
+            <a:off x="2899615" y="3149600"/>
+            <a:ext cx="228600" cy="374650"/>
+          </a:xfrm>
+          <a:prstGeom prst="rect">
+            <a:avLst/>
+          </a:prstGeom>
+          <a:solidFill>
+            <a:schemeClr val="accent3"/>
+          </a:solidFill>
+          <a:ln>
+            <a:solidFill>
+              <a:schemeClr val="tx1"/>
+            </a:solidFill>
+          </a:ln>
+          <a:effectLst/>
+        </p:spPr>
+        <p:style>
+          <a:lnRef idx="1">
+            <a:schemeClr val="accent1"/>
+          </a:lnRef>
+          <a:fillRef idx="3">
+            <a:schemeClr val="accent1"/>
+          </a:fillRef>
+          <a:effectRef idx="2">
+            <a:schemeClr val="accent1"/>
+          </a:effectRef>
+          <a:fontRef idx="minor">
+            <a:schemeClr val="lt1"/>
+          </a:fontRef>
+        </p:style>
+        <p:txBody>
+          <a:bodyPr rtlCol="0" anchor="ctr"/>
+          <a:lstStyle/>
+          <a:p>
+            <a:pPr algn="ctr"/>
+            <a:endParaRPr lang="en-US" sz="1200">
+              <a:latin typeface="Arial"/>
+              <a:cs typeface="Arial"/>
+            </a:endParaRPr>
+          </a:p>
+        </p:txBody>
+      </p:sp>
+      <p:sp>
+        <p:nvSpPr>
+          <p:cNvPr id="7" name="Rectangle 6"/>
+          <p:cNvSpPr/>
+          <p:nvPr/>
+        </p:nvSpPr>
+        <p:spPr>
+          <a:xfrm>
+            <a:off x="2671015" y="3149600"/>
+            <a:ext cx="228600" cy="374650"/>
+          </a:xfrm>
+          <a:prstGeom prst="rect">
+            <a:avLst/>
+          </a:prstGeom>
+          <a:noFill/>
+          <a:ln>
+            <a:solidFill>
+              <a:schemeClr val="tx1"/>
+            </a:solidFill>
+          </a:ln>
+          <a:effectLst/>
+        </p:spPr>
+        <p:style>
+          <a:lnRef idx="1">
+            <a:schemeClr val="accent1"/>
+          </a:lnRef>
+          <a:fillRef idx="3">
+            <a:schemeClr val="accent1"/>
+          </a:fillRef>
+          <a:effectRef idx="2">
+            <a:schemeClr val="accent1"/>
+          </a:effectRef>
+          <a:fontRef idx="minor">
+            <a:schemeClr val="lt1"/>
+          </a:fontRef>
+        </p:style>
+        <p:txBody>
+          <a:bodyPr rtlCol="0" anchor="ctr"/>
+          <a:lstStyle/>
+          <a:p>
+            <a:pPr algn="ctr"/>
+            <a:endParaRPr lang="en-US"/>
+          </a:p>
+        </p:txBody>
+      </p:sp>
+      <p:sp>
+        <p:nvSpPr>
+          <p:cNvPr id="8" name="Rectangle 7"/>
+          <p:cNvSpPr/>
+          <p:nvPr/>
+        </p:nvSpPr>
+        <p:spPr>
+          <a:xfrm>
+            <a:off x="3356815" y="3149600"/>
+            <a:ext cx="228600" cy="374650"/>
+          </a:xfrm>
+          <a:prstGeom prst="rect">
+            <a:avLst/>
+          </a:prstGeom>
+          <a:solidFill>
+            <a:schemeClr val="accent3"/>
+          </a:solidFill>
+          <a:ln>
+            <a:solidFill>
+              <a:schemeClr val="tx1"/>
+            </a:solidFill>
+          </a:ln>
+          <a:effectLst/>
+        </p:spPr>
+        <p:style>
+          <a:lnRef idx="1">
+            <a:schemeClr val="accent1"/>
+          </a:lnRef>
+          <a:fillRef idx="3">
+            <a:schemeClr val="accent1"/>
+          </a:fillRef>
+          <a:effectRef idx="2">
+            <a:schemeClr val="accent1"/>
+          </a:effectRef>
+          <a:fontRef idx="minor">
+            <a:schemeClr val="lt1"/>
+          </a:fontRef>
+        </p:style>
+        <p:txBody>
+          <a:bodyPr rtlCol="0" anchor="ctr"/>
+          <a:lstStyle/>
+          <a:p>
+            <a:pPr algn="ctr"/>
+            <a:endParaRPr lang="en-US" sz="1200">
+              <a:latin typeface="Arial"/>
+              <a:cs typeface="Arial"/>
+            </a:endParaRPr>
+          </a:p>
+        </p:txBody>
+      </p:sp>
+      <p:sp>
+        <p:nvSpPr>
+          <p:cNvPr id="9" name="Rectangle 8"/>
+          <p:cNvSpPr/>
+          <p:nvPr/>
+        </p:nvSpPr>
+        <p:spPr>
+          <a:xfrm>
+            <a:off x="3128215" y="3149600"/>
+            <a:ext cx="228600" cy="374650"/>
+          </a:xfrm>
+          <a:prstGeom prst="rect">
+            <a:avLst/>
+          </a:prstGeom>
+          <a:solidFill>
+            <a:schemeClr val="accent3"/>
+          </a:solidFill>
+          <a:ln>
+            <a:solidFill>
+              <a:schemeClr val="tx1"/>
+            </a:solidFill>
+          </a:ln>
+          <a:effectLst/>
+        </p:spPr>
+        <p:style>
+          <a:lnRef idx="1">
+            <a:schemeClr val="accent1"/>
+          </a:lnRef>
+          <a:fillRef idx="3">
+            <a:schemeClr val="accent1"/>
+          </a:fillRef>
+          <a:effectRef idx="2">
+            <a:schemeClr val="accent1"/>
+          </a:effectRef>
+          <a:fontRef idx="minor">
+            <a:schemeClr val="lt1"/>
+          </a:fontRef>
+        </p:style>
+        <p:txBody>
+          <a:bodyPr rtlCol="0" anchor="ctr"/>
+          <a:lstStyle/>
+          <a:p>
+            <a:pPr algn="ctr"/>
+            <a:endParaRPr lang="en-US" sz="1200">
+              <a:latin typeface="Arial"/>
+              <a:cs typeface="Arial"/>
+            </a:endParaRPr>
+          </a:p>
+        </p:txBody>
+      </p:sp>
+      <p:sp>
+        <p:nvSpPr>
+          <p:cNvPr id="10" name="Rectangle 9"/>
+          <p:cNvSpPr/>
+          <p:nvPr/>
+        </p:nvSpPr>
+        <p:spPr>
+          <a:xfrm>
+            <a:off x="3814015" y="3149600"/>
+            <a:ext cx="228600" cy="374650"/>
+          </a:xfrm>
+          <a:prstGeom prst="rect">
+            <a:avLst/>
+          </a:prstGeom>
+          <a:solidFill>
+            <a:schemeClr val="accent5">
+              <a:lumMod val="75000"/>
+            </a:schemeClr>
+          </a:solidFill>
+          <a:ln>
+            <a:solidFill>
+              <a:schemeClr val="tx1"/>
+            </a:solidFill>
+          </a:ln>
+          <a:effectLst/>
+        </p:spPr>
+        <p:style>
+          <a:lnRef idx="1">
+            <a:schemeClr val="accent1"/>
+          </a:lnRef>
+          <a:fillRef idx="3">
+            <a:schemeClr val="accent1"/>
+          </a:fillRef>
+          <a:effectRef idx="2">
+            <a:schemeClr val="accent1"/>
+          </a:effectRef>
+          <a:fontRef idx="minor">
+            <a:schemeClr val="lt1"/>
+          </a:fontRef>
+        </p:style>
+        <p:txBody>
+          <a:bodyPr rot="0" spcFirstLastPara="0" vertOverflow="overflow" horzOverflow="overflow" vert="horz" wrap="square" lIns="0" tIns="45720" rIns="0" bIns="45720" numCol="1" spcCol="0" rtlCol="0" fromWordArt="0" anchor="ctr" anchorCtr="0" forceAA="0" compatLnSpc="1">
+            <a:prstTxWarp prst="textNoShape">
+              <a:avLst/>
+            </a:prstTxWarp>
+            <a:noAutofit/>
+          </a:bodyPr>
+          <a:lstStyle/>
+          <a:p>
+            <a:pPr algn="ctr"/>
+            <a:endParaRPr lang="en-US" sz="1200">
+              <a:latin typeface="Arial"/>
+              <a:cs typeface="Arial"/>
+            </a:endParaRPr>
+          </a:p>
+        </p:txBody>
+      </p:sp>
+      <p:sp>
+        <p:nvSpPr>
+          <p:cNvPr id="11" name="Rectangle 10"/>
+          <p:cNvSpPr/>
+          <p:nvPr/>
+        </p:nvSpPr>
+        <p:spPr>
+          <a:xfrm>
+            <a:off x="3585415" y="3149600"/>
+            <a:ext cx="228600" cy="374650"/>
+          </a:xfrm>
+          <a:prstGeom prst="rect">
+            <a:avLst/>
+          </a:prstGeom>
+          <a:solidFill>
+            <a:schemeClr val="accent5">
+              <a:lumMod val="75000"/>
+            </a:schemeClr>
+          </a:solidFill>
+          <a:ln>
+            <a:solidFill>
+              <a:schemeClr val="tx1"/>
+            </a:solidFill>
+          </a:ln>
+          <a:effectLst/>
+        </p:spPr>
+        <p:style>
+          <a:lnRef idx="1">
+            <a:schemeClr val="accent1"/>
+          </a:lnRef>
+          <a:fillRef idx="3">
+            <a:schemeClr val="accent1"/>
+          </a:fillRef>
+          <a:effectRef idx="2">
+            <a:schemeClr val="accent1"/>
+          </a:effectRef>
+          <a:fontRef idx="minor">
+            <a:schemeClr val="lt1"/>
+          </a:fontRef>
+        </p:style>
+        <p:txBody>
+          <a:bodyPr rot="0" spcFirstLastPara="0" vertOverflow="overflow" horzOverflow="overflow" vert="horz" wrap="square" lIns="0" tIns="45720" rIns="0" bIns="45720" numCol="1" spcCol="0" rtlCol="0" fromWordArt="0" anchor="ctr" anchorCtr="0" forceAA="0" compatLnSpc="1">
+            <a:prstTxWarp prst="textNoShape">
+              <a:avLst/>
+            </a:prstTxWarp>
+            <a:noAutofit/>
+          </a:bodyPr>
+          <a:lstStyle/>
+          <a:p>
+            <a:pPr algn="ctr"/>
+            <a:endParaRPr lang="en-US" sz="1200">
+              <a:latin typeface="Arial"/>
+              <a:cs typeface="Arial"/>
+            </a:endParaRPr>
+          </a:p>
+        </p:txBody>
+      </p:sp>
+      <p:sp>
+        <p:nvSpPr>
+          <p:cNvPr id="12" name="Rectangle 11"/>
+          <p:cNvSpPr/>
+          <p:nvPr/>
+        </p:nvSpPr>
+        <p:spPr>
+          <a:xfrm>
+            <a:off x="4271215" y="3149600"/>
+            <a:ext cx="228600" cy="374650"/>
+          </a:xfrm>
+          <a:prstGeom prst="rect">
+            <a:avLst/>
+          </a:prstGeom>
+          <a:solidFill>
+            <a:schemeClr val="accent5">
+              <a:lumMod val="75000"/>
+            </a:schemeClr>
+          </a:solidFill>
+          <a:ln>
+            <a:solidFill>
+              <a:schemeClr val="tx1"/>
+            </a:solidFill>
+          </a:ln>
+          <a:effectLst/>
+        </p:spPr>
+        <p:style>
+          <a:lnRef idx="1">
+            <a:schemeClr val="accent1"/>
+          </a:lnRef>
+          <a:fillRef idx="3">
+            <a:schemeClr val="accent1"/>
+          </a:fillRef>
+          <a:effectRef idx="2">
+            <a:schemeClr val="accent1"/>
+          </a:effectRef>
+          <a:fontRef idx="minor">
+            <a:schemeClr val="lt1"/>
+          </a:fontRef>
+        </p:style>
+        <p:txBody>
+          <a:bodyPr rot="0" spcFirstLastPara="0" vertOverflow="overflow" horzOverflow="overflow" vert="horz" wrap="square" lIns="0" tIns="45720" rIns="0" bIns="45720" numCol="1" spcCol="0" rtlCol="0" fromWordArt="0" anchor="ctr" anchorCtr="0" forceAA="0" compatLnSpc="1">
+            <a:prstTxWarp prst="textNoShape">
+              <a:avLst/>
+            </a:prstTxWarp>
+            <a:noAutofit/>
+          </a:bodyPr>
+          <a:lstStyle/>
+          <a:p>
+            <a:pPr algn="ctr"/>
+            <a:endParaRPr lang="en-US" sz="1200">
+              <a:latin typeface="Arial"/>
+              <a:cs typeface="Arial"/>
+            </a:endParaRPr>
+          </a:p>
+        </p:txBody>
+      </p:sp>
+      <p:sp>
+        <p:nvSpPr>
+          <p:cNvPr id="13" name="Rectangle 12"/>
+          <p:cNvSpPr/>
+          <p:nvPr/>
+        </p:nvSpPr>
+        <p:spPr>
+          <a:xfrm>
+            <a:off x="4042615" y="3149600"/>
+            <a:ext cx="228600" cy="374650"/>
+          </a:xfrm>
+          <a:prstGeom prst="rect">
+            <a:avLst/>
+          </a:prstGeom>
+          <a:solidFill>
+            <a:schemeClr val="accent5">
+              <a:lumMod val="75000"/>
+            </a:schemeClr>
+          </a:solidFill>
+          <a:ln>
+            <a:solidFill>
+              <a:schemeClr val="tx1"/>
+            </a:solidFill>
+          </a:ln>
+          <a:effectLst/>
+        </p:spPr>
+        <p:style>
+          <a:lnRef idx="1">
+            <a:schemeClr val="accent1"/>
+          </a:lnRef>
+          <a:fillRef idx="3">
+            <a:schemeClr val="accent1"/>
+          </a:fillRef>
+          <a:effectRef idx="2">
+            <a:schemeClr val="accent1"/>
+          </a:effectRef>
+          <a:fontRef idx="minor">
+            <a:schemeClr val="lt1"/>
+          </a:fontRef>
+        </p:style>
+        <p:txBody>
+          <a:bodyPr rot="0" spcFirstLastPara="0" vertOverflow="overflow" horzOverflow="overflow" vert="horz" wrap="square" lIns="0" tIns="45720" rIns="0" bIns="45720" numCol="1" spcCol="0" rtlCol="0" fromWordArt="0" anchor="ctr" anchorCtr="0" forceAA="0" compatLnSpc="1">
+            <a:prstTxWarp prst="textNoShape">
+              <a:avLst/>
+            </a:prstTxWarp>
+            <a:noAutofit/>
+          </a:bodyPr>
+          <a:lstStyle/>
+          <a:p>
+            <a:pPr algn="ctr"/>
+            <a:endParaRPr lang="en-US" sz="1200">
+              <a:latin typeface="Arial"/>
+              <a:cs typeface="Arial"/>
+            </a:endParaRPr>
+          </a:p>
+        </p:txBody>
+      </p:sp>
+      <p:sp>
+        <p:nvSpPr>
+          <p:cNvPr id="14" name="Rectangle 13"/>
+          <p:cNvSpPr/>
+          <p:nvPr/>
+        </p:nvSpPr>
+        <p:spPr>
+          <a:xfrm>
+            <a:off x="4728415" y="3149600"/>
+            <a:ext cx="228600" cy="374650"/>
+          </a:xfrm>
+          <a:prstGeom prst="rect">
+            <a:avLst/>
+          </a:prstGeom>
+          <a:solidFill>
+            <a:schemeClr val="accent3"/>
+          </a:solidFill>
+          <a:ln>
+            <a:solidFill>
+              <a:schemeClr val="tx1"/>
+            </a:solidFill>
+          </a:ln>
+          <a:effectLst/>
+        </p:spPr>
+        <p:style>
+          <a:lnRef idx="1">
+            <a:schemeClr val="accent1"/>
+          </a:lnRef>
+          <a:fillRef idx="3">
+            <a:schemeClr val="accent1"/>
+          </a:fillRef>
+          <a:effectRef idx="2">
+            <a:schemeClr val="accent1"/>
+          </a:effectRef>
+          <a:fontRef idx="minor">
+            <a:schemeClr val="lt1"/>
+          </a:fontRef>
+        </p:style>
+        <p:txBody>
+          <a:bodyPr rtlCol="0" anchor="ctr"/>
+          <a:lstStyle/>
+          <a:p>
+            <a:pPr algn="ctr"/>
+            <a:endParaRPr lang="en-US" sz="1200">
+              <a:latin typeface="Arial"/>
+              <a:cs typeface="Arial"/>
+            </a:endParaRPr>
+          </a:p>
+        </p:txBody>
+      </p:sp>
+      <p:sp>
+        <p:nvSpPr>
+          <p:cNvPr id="15" name="Rectangle 14"/>
+          <p:cNvSpPr/>
+          <p:nvPr/>
+        </p:nvSpPr>
+        <p:spPr>
+          <a:xfrm>
+            <a:off x="4499815" y="3149600"/>
+            <a:ext cx="228600" cy="374650"/>
+          </a:xfrm>
+          <a:prstGeom prst="rect">
+            <a:avLst/>
+          </a:prstGeom>
+          <a:solidFill>
+            <a:schemeClr val="accent3"/>
+          </a:solidFill>
+          <a:ln>
+            <a:solidFill>
+              <a:schemeClr val="tx1"/>
+            </a:solidFill>
+          </a:ln>
+          <a:effectLst/>
+        </p:spPr>
+        <p:style>
+          <a:lnRef idx="1">
+            <a:schemeClr val="accent1"/>
+          </a:lnRef>
+          <a:fillRef idx="3">
+            <a:schemeClr val="accent1"/>
+          </a:fillRef>
+          <a:effectRef idx="2">
+            <a:schemeClr val="accent1"/>
+          </a:effectRef>
+          <a:fontRef idx="minor">
+            <a:schemeClr val="lt1"/>
+          </a:fontRef>
+        </p:style>
+        <p:txBody>
+          <a:bodyPr rtlCol="0" anchor="ctr"/>
+          <a:lstStyle/>
+          <a:p>
+            <a:pPr algn="ctr"/>
+            <a:endParaRPr lang="en-US" sz="1200">
+              <a:latin typeface="Arial"/>
+              <a:cs typeface="Arial"/>
+            </a:endParaRPr>
+          </a:p>
+        </p:txBody>
+      </p:sp>
+      <p:sp>
+        <p:nvSpPr>
+          <p:cNvPr id="16" name="Rectangle 15"/>
+          <p:cNvSpPr/>
+          <p:nvPr/>
+        </p:nvSpPr>
+        <p:spPr>
+          <a:xfrm>
+            <a:off x="5185615" y="3149600"/>
+            <a:ext cx="228600" cy="374650"/>
+          </a:xfrm>
+          <a:prstGeom prst="rect">
+            <a:avLst/>
+          </a:prstGeom>
+          <a:solidFill>
+            <a:schemeClr val="accent3"/>
+          </a:solidFill>
+          <a:ln>
+            <a:solidFill>
+              <a:schemeClr val="tx1"/>
+            </a:solidFill>
+          </a:ln>
+          <a:effectLst/>
+        </p:spPr>
+        <p:style>
+          <a:lnRef idx="1">
+            <a:schemeClr val="accent1"/>
+          </a:lnRef>
+          <a:fillRef idx="3">
+            <a:schemeClr val="accent1"/>
+          </a:fillRef>
+          <a:effectRef idx="2">
+            <a:schemeClr val="accent1"/>
+          </a:effectRef>
+          <a:fontRef idx="minor">
+            <a:schemeClr val="lt1"/>
+          </a:fontRef>
+        </p:style>
+        <p:txBody>
+          <a:bodyPr rtlCol="0" anchor="ctr"/>
+          <a:lstStyle/>
+          <a:p>
+            <a:pPr algn="ctr"/>
+            <a:endParaRPr lang="en-US" sz="1200">
+              <a:latin typeface="Arial"/>
+              <a:cs typeface="Arial"/>
+            </a:endParaRPr>
+          </a:p>
+        </p:txBody>
+      </p:sp>
+      <p:sp>
+        <p:nvSpPr>
+          <p:cNvPr id="17" name="Rectangle 16"/>
+          <p:cNvSpPr/>
+          <p:nvPr/>
+        </p:nvSpPr>
+        <p:spPr>
+          <a:xfrm>
+            <a:off x="4957015" y="3149600"/>
+            <a:ext cx="228600" cy="374650"/>
+          </a:xfrm>
+          <a:prstGeom prst="rect">
+            <a:avLst/>
+          </a:prstGeom>
+          <a:solidFill>
+            <a:schemeClr val="accent3"/>
+          </a:solidFill>
+          <a:ln>
+            <a:solidFill>
+              <a:schemeClr val="tx1"/>
+            </a:solidFill>
+          </a:ln>
+          <a:effectLst/>
+        </p:spPr>
+        <p:style>
+          <a:lnRef idx="1">
+            <a:schemeClr val="accent1"/>
+          </a:lnRef>
+          <a:fillRef idx="3">
+            <a:schemeClr val="accent1"/>
+          </a:fillRef>
+          <a:effectRef idx="2">
+            <a:schemeClr val="accent1"/>
+          </a:effectRef>
+          <a:fontRef idx="minor">
+            <a:schemeClr val="lt1"/>
+          </a:fontRef>
+        </p:style>
+        <p:txBody>
+          <a:bodyPr rtlCol="0" anchor="ctr"/>
+          <a:lstStyle/>
+          <a:p>
+            <a:pPr algn="ctr"/>
+            <a:endParaRPr lang="en-US" sz="1200">
+              <a:latin typeface="Arial"/>
+              <a:cs typeface="Arial"/>
+            </a:endParaRPr>
+          </a:p>
+        </p:txBody>
+      </p:sp>
+      <p:sp>
+        <p:nvSpPr>
+          <p:cNvPr id="18" name="Rectangle 17"/>
+          <p:cNvSpPr/>
+          <p:nvPr/>
+        </p:nvSpPr>
+        <p:spPr>
+          <a:xfrm>
+            <a:off x="5642815" y="3149600"/>
+            <a:ext cx="228600" cy="374650"/>
+          </a:xfrm>
+          <a:prstGeom prst="rect">
+            <a:avLst/>
+          </a:prstGeom>
+          <a:solidFill>
+            <a:schemeClr val="accent5">
+              <a:lumMod val="75000"/>
+            </a:schemeClr>
+          </a:solidFill>
+          <a:ln>
+            <a:solidFill>
+              <a:schemeClr val="tx1"/>
+            </a:solidFill>
+          </a:ln>
+          <a:effectLst/>
+        </p:spPr>
+        <p:style>
+          <a:lnRef idx="1">
+            <a:schemeClr val="accent1"/>
+          </a:lnRef>
+          <a:fillRef idx="3">
+            <a:schemeClr val="accent1"/>
+          </a:fillRef>
+          <a:effectRef idx="2">
+            <a:schemeClr val="accent1"/>
+          </a:effectRef>
+          <a:fontRef idx="minor">
+            <a:schemeClr val="lt1"/>
+          </a:fontRef>
+        </p:style>
+        <p:txBody>
+          <a:bodyPr rot="0" spcFirstLastPara="0" vertOverflow="overflow" horzOverflow="overflow" vert="horz" wrap="square" lIns="0" tIns="45720" rIns="0" bIns="45720" numCol="1" spcCol="0" rtlCol="0" fromWordArt="0" anchor="ctr" anchorCtr="0" forceAA="0" compatLnSpc="1">
+            <a:prstTxWarp prst="textNoShape">
+              <a:avLst/>
+            </a:prstTxWarp>
+            <a:noAutofit/>
+          </a:bodyPr>
+          <a:lstStyle/>
+          <a:p>
+            <a:pPr algn="ctr"/>
+            <a:endParaRPr lang="en-US" sz="1200">
+              <a:latin typeface="Arial"/>
+              <a:cs typeface="Arial"/>
+            </a:endParaRPr>
+          </a:p>
+        </p:txBody>
+      </p:sp>
+      <p:sp>
+        <p:nvSpPr>
+          <p:cNvPr id="19" name="Rectangle 18"/>
+          <p:cNvSpPr/>
+          <p:nvPr/>
+        </p:nvSpPr>
+        <p:spPr>
+          <a:xfrm>
+            <a:off x="5414215" y="3149600"/>
+            <a:ext cx="228600" cy="374650"/>
+          </a:xfrm>
+          <a:prstGeom prst="rect">
+            <a:avLst/>
+          </a:prstGeom>
+          <a:solidFill>
+            <a:schemeClr val="accent3"/>
+          </a:solidFill>
+          <a:ln>
+            <a:solidFill>
+              <a:schemeClr val="tx1"/>
+            </a:solidFill>
+          </a:ln>
+          <a:effectLst/>
+        </p:spPr>
+        <p:style>
+          <a:lnRef idx="1">
+            <a:schemeClr val="accent1"/>
+          </a:lnRef>
+          <a:fillRef idx="3">
+            <a:schemeClr val="accent1"/>
+          </a:fillRef>
+          <a:effectRef idx="2">
+            <a:schemeClr val="accent1"/>
+          </a:effectRef>
+          <a:fontRef idx="minor">
+            <a:schemeClr val="lt1"/>
+          </a:fontRef>
+        </p:style>
+        <p:txBody>
+          <a:bodyPr rtlCol="0" anchor="ctr"/>
+          <a:lstStyle/>
+          <a:p>
+            <a:pPr algn="ctr"/>
+            <a:endParaRPr lang="en-US" sz="1200">
+              <a:latin typeface="Arial"/>
+              <a:cs typeface="Arial"/>
+            </a:endParaRPr>
+          </a:p>
+        </p:txBody>
+      </p:sp>
+      <p:sp>
+        <p:nvSpPr>
+          <p:cNvPr id="20" name="Rectangle 19"/>
+          <p:cNvSpPr/>
+          <p:nvPr/>
+        </p:nvSpPr>
+        <p:spPr>
+          <a:xfrm>
+            <a:off x="5871415" y="3149600"/>
+            <a:ext cx="228600" cy="374650"/>
+          </a:xfrm>
+          <a:prstGeom prst="rect">
+            <a:avLst/>
+          </a:prstGeom>
+          <a:solidFill>
+            <a:schemeClr val="accent5">
+              <a:lumMod val="75000"/>
+            </a:schemeClr>
+          </a:solidFill>
+          <a:ln>
+            <a:solidFill>
+              <a:schemeClr val="tx1"/>
+            </a:solidFill>
+          </a:ln>
+          <a:effectLst/>
+        </p:spPr>
+        <p:style>
+          <a:lnRef idx="1">
+            <a:schemeClr val="accent1"/>
+          </a:lnRef>
+          <a:fillRef idx="3">
+            <a:schemeClr val="accent1"/>
+          </a:fillRef>
+          <a:effectRef idx="2">
+            <a:schemeClr val="accent1"/>
+          </a:effectRef>
+          <a:fontRef idx="minor">
+            <a:schemeClr val="lt1"/>
+          </a:fontRef>
+        </p:style>
+        <p:txBody>
+          <a:bodyPr rot="0" spcFirstLastPara="0" vertOverflow="overflow" horzOverflow="overflow" vert="horz" wrap="square" lIns="0" tIns="45720" rIns="0" bIns="45720" numCol="1" spcCol="0" rtlCol="0" fromWordArt="0" anchor="ctr" anchorCtr="0" forceAA="0" compatLnSpc="1">
+            <a:prstTxWarp prst="textNoShape">
+              <a:avLst/>
+            </a:prstTxWarp>
+            <a:noAutofit/>
+          </a:bodyPr>
+          <a:lstStyle/>
+          <a:p>
+            <a:pPr algn="ctr"/>
+            <a:endParaRPr lang="en-US" sz="1200">
+              <a:latin typeface="Arial"/>
+              <a:cs typeface="Arial"/>
+            </a:endParaRPr>
+          </a:p>
+        </p:txBody>
+      </p:sp>
+      <p:sp>
+        <p:nvSpPr>
+          <p:cNvPr id="21" name="Rectangle 20"/>
+          <p:cNvSpPr/>
+          <p:nvPr/>
+        </p:nvSpPr>
+        <p:spPr>
+          <a:xfrm>
+            <a:off x="6328615" y="3149600"/>
+            <a:ext cx="228600" cy="374650"/>
+          </a:xfrm>
+          <a:prstGeom prst="rect">
+            <a:avLst/>
+          </a:prstGeom>
+          <a:solidFill>
+            <a:schemeClr val="accent5">
+              <a:lumMod val="75000"/>
+            </a:schemeClr>
+          </a:solidFill>
+          <a:ln>
+            <a:solidFill>
+              <a:schemeClr val="tx1"/>
+            </a:solidFill>
+          </a:ln>
+          <a:effectLst/>
+        </p:spPr>
+        <p:style>
+          <a:lnRef idx="1">
+            <a:schemeClr val="accent1"/>
+          </a:lnRef>
+          <a:fillRef idx="3">
+            <a:schemeClr val="accent1"/>
+          </a:fillRef>
+          <a:effectRef idx="2">
+            <a:schemeClr val="accent1"/>
+          </a:effectRef>
+          <a:fontRef idx="minor">
+            <a:schemeClr val="lt1"/>
+          </a:fontRef>
+        </p:style>
+        <p:txBody>
+          <a:bodyPr rot="0" spcFirstLastPara="0" vertOverflow="overflow" horzOverflow="overflow" vert="horz" wrap="square" lIns="0" tIns="45720" rIns="0" bIns="45720" numCol="1" spcCol="0" rtlCol="0" fromWordArt="0" anchor="ctr" anchorCtr="0" forceAA="0" compatLnSpc="1">
+            <a:prstTxWarp prst="textNoShape">
+              <a:avLst/>
+            </a:prstTxWarp>
+            <a:noAutofit/>
+          </a:bodyPr>
+          <a:lstStyle/>
+          <a:p>
+            <a:pPr algn="ctr"/>
+            <a:endParaRPr lang="en-US" sz="1200">
+              <a:latin typeface="Arial"/>
+              <a:cs typeface="Arial"/>
+            </a:endParaRPr>
+          </a:p>
+        </p:txBody>
+      </p:sp>
+      <p:sp>
+        <p:nvSpPr>
+          <p:cNvPr id="22" name="Rectangle 21"/>
+          <p:cNvSpPr/>
+          <p:nvPr/>
+        </p:nvSpPr>
+        <p:spPr>
+          <a:xfrm>
+            <a:off x="6100015" y="3149600"/>
+            <a:ext cx="228600" cy="374650"/>
+          </a:xfrm>
+          <a:prstGeom prst="rect">
+            <a:avLst/>
+          </a:prstGeom>
+          <a:solidFill>
+            <a:schemeClr val="accent5">
+              <a:lumMod val="75000"/>
+            </a:schemeClr>
+          </a:solidFill>
+          <a:ln>
+            <a:solidFill>
+              <a:schemeClr val="tx1"/>
+            </a:solidFill>
+          </a:ln>
+          <a:effectLst/>
+        </p:spPr>
+        <p:style>
+          <a:lnRef idx="1">
+            <a:schemeClr val="accent1"/>
+          </a:lnRef>
+          <a:fillRef idx="3">
+            <a:schemeClr val="accent1"/>
+          </a:fillRef>
+          <a:effectRef idx="2">
+            <a:schemeClr val="accent1"/>
+          </a:effectRef>
+          <a:fontRef idx="minor">
+            <a:schemeClr val="lt1"/>
+          </a:fontRef>
+        </p:style>
+        <p:txBody>
+          <a:bodyPr rot="0" spcFirstLastPara="0" vertOverflow="overflow" horzOverflow="overflow" vert="horz" wrap="square" lIns="0" tIns="45720" rIns="0" bIns="45720" numCol="1" spcCol="0" rtlCol="0" fromWordArt="0" anchor="ctr" anchorCtr="0" forceAA="0" compatLnSpc="1">
+            <a:prstTxWarp prst="textNoShape">
+              <a:avLst/>
+            </a:prstTxWarp>
+            <a:noAutofit/>
+          </a:bodyPr>
+          <a:lstStyle/>
+          <a:p>
+            <a:pPr algn="ctr"/>
+            <a:endParaRPr lang="en-US" sz="1200">
+              <a:latin typeface="Arial"/>
+              <a:cs typeface="Arial"/>
+            </a:endParaRPr>
+          </a:p>
+        </p:txBody>
+      </p:sp>
+      <p:sp>
+        <p:nvSpPr>
+          <p:cNvPr id="23" name="Rectangle 22"/>
+          <p:cNvSpPr/>
+          <p:nvPr/>
+        </p:nvSpPr>
+        <p:spPr>
+          <a:xfrm>
+            <a:off x="6785815" y="3149600"/>
+            <a:ext cx="228600" cy="374650"/>
+          </a:xfrm>
+          <a:prstGeom prst="rect">
+            <a:avLst/>
+          </a:prstGeom>
+          <a:noFill/>
+          <a:ln>
+            <a:solidFill>
+              <a:schemeClr val="tx1"/>
+            </a:solidFill>
+          </a:ln>
+          <a:effectLst/>
+        </p:spPr>
+        <p:style>
+          <a:lnRef idx="1">
+            <a:schemeClr val="accent1"/>
+          </a:lnRef>
+          <a:fillRef idx="3">
+            <a:schemeClr val="accent1"/>
+          </a:fillRef>
+          <a:effectRef idx="2">
+            <a:schemeClr val="accent1"/>
+          </a:effectRef>
+          <a:fontRef idx="minor">
+            <a:schemeClr val="lt1"/>
+          </a:fontRef>
+        </p:style>
+        <p:txBody>
+          <a:bodyPr rtlCol="0" anchor="ctr"/>
+          <a:lstStyle/>
+          <a:p>
+            <a:pPr algn="ctr"/>
+            <a:endParaRPr lang="en-US"/>
+          </a:p>
+        </p:txBody>
+      </p:sp>
+      <p:sp>
+        <p:nvSpPr>
+          <p:cNvPr id="24" name="Rectangle 23"/>
+          <p:cNvSpPr/>
+          <p:nvPr/>
+        </p:nvSpPr>
+        <p:spPr>
+          <a:xfrm>
+            <a:off x="6557215" y="3149600"/>
+            <a:ext cx="228600" cy="374650"/>
+          </a:xfrm>
+          <a:prstGeom prst="rect">
+            <a:avLst/>
+          </a:prstGeom>
+          <a:solidFill>
+            <a:schemeClr val="accent5">
+              <a:lumMod val="75000"/>
+            </a:schemeClr>
+          </a:solidFill>
+          <a:ln>
+            <a:solidFill>
+              <a:schemeClr val="tx1"/>
+            </a:solidFill>
+          </a:ln>
+          <a:effectLst/>
+        </p:spPr>
+        <p:style>
+          <a:lnRef idx="1">
+            <a:schemeClr val="accent1"/>
+          </a:lnRef>
+          <a:fillRef idx="3">
+            <a:schemeClr val="accent1"/>
+          </a:fillRef>
+          <a:effectRef idx="2">
+            <a:schemeClr val="accent1"/>
+          </a:effectRef>
+          <a:fontRef idx="minor">
+            <a:schemeClr val="lt1"/>
+          </a:fontRef>
+        </p:style>
+        <p:txBody>
+          <a:bodyPr rot="0" spcFirstLastPara="0" vertOverflow="overflow" horzOverflow="overflow" vert="horz" wrap="square" lIns="0" tIns="45720" rIns="0" bIns="45720" numCol="1" spcCol="0" rtlCol="0" fromWordArt="0" anchor="ctr" anchorCtr="0" forceAA="0" compatLnSpc="1">
+            <a:prstTxWarp prst="textNoShape">
+              <a:avLst/>
+            </a:prstTxWarp>
+            <a:noAutofit/>
+          </a:bodyPr>
+          <a:lstStyle/>
+          <a:p>
+            <a:pPr algn="ctr"/>
+            <a:endParaRPr lang="en-US" sz="1200">
+              <a:latin typeface="Arial"/>
+              <a:cs typeface="Arial"/>
+            </a:endParaRPr>
+          </a:p>
+        </p:txBody>
+      </p:sp>
+      <p:grpSp>
+        <p:nvGrpSpPr>
+          <p:cNvPr id="32" name="Group 31"/>
+          <p:cNvGrpSpPr/>
+          <p:nvPr/>
+        </p:nvGrpSpPr>
+        <p:grpSpPr>
+          <a:xfrm>
+            <a:off x="1101549" y="3323209"/>
+            <a:ext cx="275082" cy="27432"/>
+            <a:chOff x="1311099" y="3338003"/>
+            <a:chExt cx="275082" cy="27432"/>
+          </a:xfrm>
+        </p:grpSpPr>
+        <p:sp>
+          <p:nvSpPr>
+            <p:cNvPr id="28" name="Oval 27"/>
+            <p:cNvSpPr/>
+            <p:nvPr/>
+          </p:nvSpPr>
+          <p:spPr>
+            <a:xfrm>
+              <a:off x="1558749" y="3338003"/>
+              <a:ext cx="27432" cy="27432"/>
+            </a:xfrm>
+            <a:prstGeom prst="ellipse">
+              <a:avLst/>
+            </a:prstGeom>
+            <a:solidFill>
+              <a:schemeClr val="tx1"/>
+            </a:solidFill>
+            <a:ln>
+              <a:noFill/>
+            </a:ln>
+            <a:effectLst/>
+          </p:spPr>
+          <p:style>
+            <a:lnRef idx="1">
+              <a:schemeClr val="accent1"/>
+            </a:lnRef>
+            <a:fillRef idx="3">
+              <a:schemeClr val="accent1"/>
+            </a:fillRef>
+            <a:effectRef idx="2">
+              <a:schemeClr val="accent1"/>
+            </a:effectRef>
+            <a:fontRef idx="minor">
+              <a:schemeClr val="lt1"/>
+            </a:fontRef>
+          </p:style>
+          <p:txBody>
+            <a:bodyPr rtlCol="0" anchor="ctr"/>
+            <a:lstStyle/>
+            <a:p>
+              <a:pPr algn="ctr"/>
+              <a:endParaRPr lang="en-US"/>
+            </a:p>
+          </p:txBody>
+        </p:sp>
+        <p:sp>
+          <p:nvSpPr>
+            <p:cNvPr id="29" name="Oval 28"/>
+            <p:cNvSpPr/>
+            <p:nvPr/>
+          </p:nvSpPr>
+          <p:spPr>
+            <a:xfrm>
+              <a:off x="1434924" y="3338003"/>
+              <a:ext cx="27432" cy="27432"/>
+            </a:xfrm>
+            <a:prstGeom prst="ellipse">
+              <a:avLst/>
+            </a:prstGeom>
+            <a:solidFill>
+              <a:schemeClr val="tx1"/>
+            </a:solidFill>
+            <a:ln>
+              <a:noFill/>
+            </a:ln>
+            <a:effectLst/>
+          </p:spPr>
+          <p:style>
+            <a:lnRef idx="1">
+              <a:schemeClr val="accent1"/>
+            </a:lnRef>
+            <a:fillRef idx="3">
+              <a:schemeClr val="accent1"/>
+            </a:fillRef>
+            <a:effectRef idx="2">
+              <a:schemeClr val="accent1"/>
+            </a:effectRef>
+            <a:fontRef idx="minor">
+              <a:schemeClr val="lt1"/>
+            </a:fontRef>
+          </p:style>
+          <p:txBody>
+            <a:bodyPr rtlCol="0" anchor="ctr"/>
+            <a:lstStyle/>
+            <a:p>
+              <a:pPr algn="ctr"/>
+              <a:endParaRPr lang="en-US"/>
+            </a:p>
+          </p:txBody>
+        </p:sp>
+        <p:sp>
+          <p:nvSpPr>
+            <p:cNvPr id="30" name="Oval 29"/>
+            <p:cNvSpPr/>
+            <p:nvPr/>
+          </p:nvSpPr>
+          <p:spPr>
+            <a:xfrm>
+              <a:off x="1311099" y="3338003"/>
+              <a:ext cx="27432" cy="27432"/>
+            </a:xfrm>
+            <a:prstGeom prst="ellipse">
+              <a:avLst/>
+            </a:prstGeom>
+            <a:solidFill>
+              <a:schemeClr val="tx1"/>
+            </a:solidFill>
+            <a:ln>
+              <a:noFill/>
+            </a:ln>
+            <a:effectLst/>
+          </p:spPr>
+          <p:style>
+            <a:lnRef idx="1">
+              <a:schemeClr val="accent1"/>
+            </a:lnRef>
+            <a:fillRef idx="3">
+              <a:schemeClr val="accent1"/>
+            </a:fillRef>
+            <a:effectRef idx="2">
+              <a:schemeClr val="accent1"/>
+            </a:effectRef>
+            <a:fontRef idx="minor">
+              <a:schemeClr val="lt1"/>
+            </a:fontRef>
+          </p:style>
+          <p:txBody>
+            <a:bodyPr rtlCol="0" anchor="ctr"/>
+            <a:lstStyle/>
+            <a:p>
+              <a:pPr algn="ctr"/>
+              <a:endParaRPr lang="en-US"/>
+            </a:p>
+          </p:txBody>
+        </p:sp>
+      </p:grpSp>
+      <p:grpSp>
+        <p:nvGrpSpPr>
+          <p:cNvPr id="33" name="Group 32"/>
+          <p:cNvGrpSpPr/>
+          <p:nvPr/>
+        </p:nvGrpSpPr>
+        <p:grpSpPr>
+          <a:xfrm>
+            <a:off x="7845249" y="3323209"/>
+            <a:ext cx="275082" cy="27432"/>
+            <a:chOff x="1311099" y="3338003"/>
+            <a:chExt cx="275082" cy="27432"/>
+          </a:xfrm>
+        </p:grpSpPr>
+        <p:sp>
+          <p:nvSpPr>
+            <p:cNvPr id="34" name="Oval 33"/>
+            <p:cNvSpPr/>
+            <p:nvPr/>
+          </p:nvSpPr>
+          <p:spPr>
+            <a:xfrm>
+              <a:off x="1558749" y="3338003"/>
+              <a:ext cx="27432" cy="27432"/>
+            </a:xfrm>
+            <a:prstGeom prst="ellipse">
+              <a:avLst/>
+            </a:prstGeom>
+            <a:solidFill>
+              <a:schemeClr val="tx1"/>
+            </a:solidFill>
+            <a:ln>
+              <a:noFill/>
+            </a:ln>
+            <a:effectLst/>
+          </p:spPr>
+          <p:style>
+            <a:lnRef idx="1">
+              <a:schemeClr val="accent1"/>
+            </a:lnRef>
+            <a:fillRef idx="3">
+              <a:schemeClr val="accent1"/>
+            </a:fillRef>
+            <a:effectRef idx="2">
+              <a:schemeClr val="accent1"/>
+            </a:effectRef>
+            <a:fontRef idx="minor">
+              <a:schemeClr val="lt1"/>
+            </a:fontRef>
+          </p:style>
+          <p:txBody>
+            <a:bodyPr rtlCol="0" anchor="ctr"/>
+            <a:lstStyle/>
+            <a:p>
+              <a:pPr algn="ctr"/>
+              <a:endParaRPr lang="en-US"/>
+            </a:p>
+          </p:txBody>
+        </p:sp>
+        <p:sp>
+          <p:nvSpPr>
+            <p:cNvPr id="35" name="Oval 34"/>
+            <p:cNvSpPr/>
+            <p:nvPr/>
+          </p:nvSpPr>
+          <p:spPr>
+            <a:xfrm>
+              <a:off x="1434924" y="3338003"/>
+              <a:ext cx="27432" cy="27432"/>
+            </a:xfrm>
+            <a:prstGeom prst="ellipse">
+              <a:avLst/>
+            </a:prstGeom>
+            <a:solidFill>
+              <a:schemeClr val="tx1"/>
+            </a:solidFill>
+            <a:ln>
+              <a:noFill/>
+            </a:ln>
+            <a:effectLst/>
+          </p:spPr>
+          <p:style>
+            <a:lnRef idx="1">
+              <a:schemeClr val="accent1"/>
+            </a:lnRef>
+            <a:fillRef idx="3">
+              <a:schemeClr val="accent1"/>
+            </a:fillRef>
+            <a:effectRef idx="2">
+              <a:schemeClr val="accent1"/>
+            </a:effectRef>
+            <a:fontRef idx="minor">
+              <a:schemeClr val="lt1"/>
+            </a:fontRef>
+          </p:style>
+          <p:txBody>
+            <a:bodyPr rtlCol="0" anchor="ctr"/>
+            <a:lstStyle/>
+            <a:p>
+              <a:pPr algn="ctr"/>
+              <a:endParaRPr lang="en-US"/>
+            </a:p>
+          </p:txBody>
+        </p:sp>
+        <p:sp>
+          <p:nvSpPr>
+            <p:cNvPr id="36" name="Oval 35"/>
+            <p:cNvSpPr/>
+            <p:nvPr/>
+          </p:nvSpPr>
+          <p:spPr>
+            <a:xfrm>
+              <a:off x="1311099" y="3338003"/>
+              <a:ext cx="27432" cy="27432"/>
+            </a:xfrm>
+            <a:prstGeom prst="ellipse">
+              <a:avLst/>
+            </a:prstGeom>
+            <a:solidFill>
+              <a:schemeClr val="tx1"/>
+            </a:solidFill>
+            <a:ln>
+              <a:noFill/>
+            </a:ln>
+            <a:effectLst/>
+          </p:spPr>
+          <p:style>
+            <a:lnRef idx="1">
+              <a:schemeClr val="accent1"/>
+            </a:lnRef>
+            <a:fillRef idx="3">
+              <a:schemeClr val="accent1"/>
+            </a:fillRef>
+            <a:effectRef idx="2">
+              <a:schemeClr val="accent1"/>
+            </a:effectRef>
+            <a:fontRef idx="minor">
+              <a:schemeClr val="lt1"/>
+            </a:fontRef>
+          </p:style>
+          <p:txBody>
+            <a:bodyPr rtlCol="0" anchor="ctr"/>
+            <a:lstStyle/>
+            <a:p>
+              <a:pPr algn="ctr"/>
+              <a:endParaRPr lang="en-US"/>
+            </a:p>
+          </p:txBody>
+        </p:sp>
+      </p:grpSp>
+      <p:grpSp>
+        <p:nvGrpSpPr>
+          <p:cNvPr id="47" name="Group 46"/>
+          <p:cNvGrpSpPr/>
+          <p:nvPr/>
+        </p:nvGrpSpPr>
+        <p:grpSpPr>
+          <a:xfrm>
+            <a:off x="1940765" y="2400300"/>
+            <a:ext cx="2559050" cy="374650"/>
+            <a:chOff x="2213815" y="2400300"/>
+            <a:chExt cx="2559050" cy="374650"/>
+          </a:xfrm>
+        </p:grpSpPr>
+        <p:sp>
+          <p:nvSpPr>
+            <p:cNvPr id="38" name="Rectangle 37"/>
+            <p:cNvSpPr/>
+            <p:nvPr/>
+          </p:nvSpPr>
+          <p:spPr>
+            <a:xfrm>
+              <a:off x="2715465" y="2400300"/>
+              <a:ext cx="2057400" cy="374650"/>
+            </a:xfrm>
+            <a:prstGeom prst="rect">
+              <a:avLst/>
+            </a:prstGeom>
+            <a:solidFill>
+              <a:schemeClr val="accent3"/>
+            </a:solidFill>
+            <a:ln>
+              <a:solidFill>
+                <a:schemeClr val="tx1"/>
+              </a:solidFill>
+            </a:ln>
+            <a:effectLst/>
+          </p:spPr>
+          <p:style>
+            <a:lnRef idx="1">
+              <a:schemeClr val="accent1"/>
+            </a:lnRef>
+            <a:fillRef idx="3">
+              <a:schemeClr val="accent1"/>
+            </a:fillRef>
+            <a:effectRef idx="2">
+              <a:schemeClr val="accent1"/>
+            </a:effectRef>
+            <a:fontRef idx="minor">
+              <a:schemeClr val="lt1"/>
+            </a:fontRef>
+          </p:style>
+          <p:txBody>
+            <a:bodyPr rtlCol="0" anchor="ctr"/>
+            <a:lstStyle/>
+            <a:p>
+              <a:pPr algn="ctr"/>
+              <a:r>
+                <a:rPr lang="en-US" sz="1200" dirty="0" smtClean="0">
+                  <a:latin typeface="Arial"/>
+                  <a:cs typeface="Arial"/>
+                </a:rPr>
+                <a:t>IA Data Transmissions</a:t>
+              </a:r>
+              <a:endParaRPr lang="en-US" sz="1200" dirty="0">
+                <a:latin typeface="Arial"/>
+                <a:cs typeface="Arial"/>
+              </a:endParaRPr>
+            </a:p>
+          </p:txBody>
+        </p:sp>
+        <p:sp>
+          <p:nvSpPr>
+            <p:cNvPr id="42" name="Rectangle 41"/>
+            <p:cNvSpPr/>
+            <p:nvPr/>
+          </p:nvSpPr>
+          <p:spPr>
+            <a:xfrm>
+              <a:off x="2213815" y="2400300"/>
+              <a:ext cx="228600" cy="374650"/>
+            </a:xfrm>
+            <a:prstGeom prst="rect">
+              <a:avLst/>
+            </a:prstGeom>
+            <a:solidFill>
+              <a:schemeClr val="accent3"/>
+            </a:solidFill>
+            <a:ln>
+              <a:solidFill>
+                <a:schemeClr val="tx1"/>
+              </a:solidFill>
+            </a:ln>
+            <a:effectLst/>
+          </p:spPr>
+          <p:style>
+            <a:lnRef idx="1">
+              <a:schemeClr val="accent1"/>
+            </a:lnRef>
+            <a:fillRef idx="3">
+              <a:schemeClr val="accent1"/>
+            </a:fillRef>
+            <a:effectRef idx="2">
+              <a:schemeClr val="accent1"/>
+            </a:effectRef>
+            <a:fontRef idx="minor">
+              <a:schemeClr val="lt1"/>
+            </a:fontRef>
+          </p:style>
+          <p:txBody>
+            <a:bodyPr lIns="0" rIns="0" rtlCol="0" anchor="ctr"/>
+            <a:lstStyle/>
+            <a:p>
+              <a:pPr algn="ctr"/>
+              <a:r>
+                <a:rPr lang="en-US" sz="1200" dirty="0" smtClean="0">
+                  <a:latin typeface="Arial"/>
+                  <a:cs typeface="Arial"/>
+                </a:rPr>
+                <a:t>F</a:t>
+              </a:r>
+              <a:endParaRPr lang="en-US" sz="1200" dirty="0">
+                <a:latin typeface="Arial"/>
+                <a:cs typeface="Arial"/>
+              </a:endParaRPr>
+            </a:p>
+          </p:txBody>
+        </p:sp>
+        <p:sp>
+          <p:nvSpPr>
+            <p:cNvPr id="43" name="Rectangle 42"/>
+            <p:cNvSpPr/>
+            <p:nvPr/>
+          </p:nvSpPr>
+          <p:spPr>
+            <a:xfrm>
+              <a:off x="2442415" y="2400300"/>
+              <a:ext cx="273050" cy="374650"/>
+            </a:xfrm>
+            <a:prstGeom prst="rect">
+              <a:avLst/>
+            </a:prstGeom>
+            <a:solidFill>
+              <a:schemeClr val="accent3"/>
+            </a:solidFill>
+            <a:ln>
+              <a:solidFill>
+                <a:schemeClr val="tx1"/>
+              </a:solidFill>
+            </a:ln>
+            <a:effectLst/>
+          </p:spPr>
+          <p:style>
+            <a:lnRef idx="1">
+              <a:schemeClr val="accent1"/>
+            </a:lnRef>
+            <a:fillRef idx="3">
+              <a:schemeClr val="accent1"/>
+            </a:fillRef>
+            <a:effectRef idx="2">
+              <a:schemeClr val="accent1"/>
+            </a:effectRef>
+            <a:fontRef idx="minor">
+              <a:schemeClr val="lt1"/>
+            </a:fontRef>
+          </p:style>
+          <p:txBody>
+            <a:bodyPr rot="0" spcFirstLastPara="0" vertOverflow="overflow" horzOverflow="overflow" vert="horz" wrap="square" lIns="0" tIns="45720" rIns="0" bIns="45720" numCol="1" spcCol="0" rtlCol="0" fromWordArt="0" anchor="ctr" anchorCtr="0" forceAA="0" compatLnSpc="1">
+              <a:prstTxWarp prst="textNoShape">
+                <a:avLst/>
+              </a:prstTxWarp>
+              <a:noAutofit/>
+            </a:bodyPr>
+            <a:lstStyle/>
+            <a:p>
+              <a:pPr algn="ctr"/>
+              <a:r>
+                <a:rPr lang="en-US" sz="1200" dirty="0">
+                  <a:latin typeface="Arial"/>
+                  <a:cs typeface="Arial"/>
+                </a:rPr>
+                <a:t>V</a:t>
+              </a:r>
+            </a:p>
+          </p:txBody>
+        </p:sp>
+      </p:grpSp>
+      <p:grpSp>
+        <p:nvGrpSpPr>
+          <p:cNvPr id="49" name="Group 48"/>
+          <p:cNvGrpSpPr/>
+          <p:nvPr/>
+        </p:nvGrpSpPr>
+        <p:grpSpPr>
+          <a:xfrm>
+            <a:off x="4888181" y="2387600"/>
+            <a:ext cx="2894584" cy="374650"/>
+            <a:chOff x="4963365" y="2387600"/>
+            <a:chExt cx="2894584" cy="374650"/>
+          </a:xfrm>
+        </p:grpSpPr>
+        <p:sp>
+          <p:nvSpPr>
+            <p:cNvPr id="44" name="Rectangle 43"/>
+            <p:cNvSpPr/>
+            <p:nvPr/>
+          </p:nvSpPr>
+          <p:spPr>
+            <a:xfrm>
+              <a:off x="5630115" y="2387600"/>
+              <a:ext cx="2227834" cy="374650"/>
+            </a:xfrm>
+            <a:prstGeom prst="rect">
+              <a:avLst/>
+            </a:prstGeom>
+            <a:solidFill>
+              <a:schemeClr val="accent5">
+                <a:lumMod val="75000"/>
+              </a:schemeClr>
+            </a:solidFill>
+            <a:ln>
+              <a:solidFill>
+                <a:schemeClr val="tx1"/>
+              </a:solidFill>
+            </a:ln>
+            <a:effectLst/>
+          </p:spPr>
+          <p:style>
+            <a:lnRef idx="1">
+              <a:schemeClr val="accent1"/>
+            </a:lnRef>
+            <a:fillRef idx="3">
+              <a:schemeClr val="accent1"/>
+            </a:fillRef>
+            <a:effectRef idx="2">
+              <a:schemeClr val="accent1"/>
+            </a:effectRef>
+            <a:fontRef idx="minor">
+              <a:schemeClr val="lt1"/>
+            </a:fontRef>
+          </p:style>
+          <p:txBody>
+            <a:bodyPr rtlCol="0" anchor="ctr"/>
+            <a:lstStyle/>
+            <a:p>
+              <a:pPr algn="ctr"/>
+              <a:r>
+                <a:rPr lang="en-US" sz="1200" dirty="0" smtClean="0">
+                  <a:latin typeface="Arial"/>
+                  <a:cs typeface="Arial"/>
+                </a:rPr>
+                <a:t>IA Data Transmissions</a:t>
+              </a:r>
+              <a:endParaRPr lang="en-US" sz="1200" dirty="0">
+                <a:latin typeface="Arial"/>
+                <a:cs typeface="Arial"/>
+              </a:endParaRPr>
+            </a:p>
+          </p:txBody>
+        </p:sp>
+        <p:sp>
+          <p:nvSpPr>
+            <p:cNvPr id="45" name="Rectangle 44"/>
+            <p:cNvSpPr/>
+            <p:nvPr/>
+          </p:nvSpPr>
+          <p:spPr>
+            <a:xfrm>
+              <a:off x="4963365" y="2387600"/>
+              <a:ext cx="228600" cy="374650"/>
+            </a:xfrm>
+            <a:prstGeom prst="rect">
+              <a:avLst/>
+            </a:prstGeom>
+            <a:solidFill>
+              <a:schemeClr val="accent5">
+                <a:lumMod val="75000"/>
+              </a:schemeClr>
+            </a:solidFill>
+            <a:ln>
+              <a:solidFill>
+                <a:schemeClr val="tx1"/>
+              </a:solidFill>
+            </a:ln>
+            <a:effectLst/>
+          </p:spPr>
+          <p:style>
+            <a:lnRef idx="1">
+              <a:schemeClr val="accent1"/>
+            </a:lnRef>
+            <a:fillRef idx="3">
+              <a:schemeClr val="accent1"/>
+            </a:fillRef>
+            <a:effectRef idx="2">
+              <a:schemeClr val="accent1"/>
+            </a:effectRef>
+            <a:fontRef idx="minor">
+              <a:schemeClr val="lt1"/>
+            </a:fontRef>
+          </p:style>
+          <p:txBody>
+            <a:bodyPr lIns="0" rIns="0" rtlCol="0" anchor="ctr"/>
+            <a:lstStyle/>
+            <a:p>
+              <a:pPr algn="ctr"/>
+              <a:r>
+                <a:rPr lang="en-US" sz="1200" dirty="0" smtClean="0">
+                  <a:latin typeface="Arial"/>
+                  <a:cs typeface="Arial"/>
+                </a:rPr>
+                <a:t>F</a:t>
+              </a:r>
+              <a:endParaRPr lang="en-US" sz="1200" dirty="0">
+                <a:latin typeface="Arial"/>
+                <a:cs typeface="Arial"/>
+              </a:endParaRPr>
+            </a:p>
+          </p:txBody>
+        </p:sp>
+        <p:sp>
+          <p:nvSpPr>
+            <p:cNvPr id="46" name="Rectangle 45"/>
+            <p:cNvSpPr/>
+            <p:nvPr/>
+          </p:nvSpPr>
+          <p:spPr>
+            <a:xfrm>
+              <a:off x="5191964" y="2387600"/>
+              <a:ext cx="439469" cy="374650"/>
+            </a:xfrm>
+            <a:prstGeom prst="rect">
+              <a:avLst/>
+            </a:prstGeom>
+            <a:solidFill>
+              <a:schemeClr val="accent5">
+                <a:lumMod val="75000"/>
+              </a:schemeClr>
+            </a:solidFill>
+            <a:ln>
+              <a:solidFill>
+                <a:schemeClr val="tx1"/>
+              </a:solidFill>
+            </a:ln>
+            <a:effectLst/>
+          </p:spPr>
+          <p:style>
+            <a:lnRef idx="1">
+              <a:schemeClr val="accent1"/>
+            </a:lnRef>
+            <a:fillRef idx="3">
+              <a:schemeClr val="accent1"/>
+            </a:fillRef>
+            <a:effectRef idx="2">
+              <a:schemeClr val="accent1"/>
+            </a:effectRef>
+            <a:fontRef idx="minor">
+              <a:schemeClr val="lt1"/>
+            </a:fontRef>
+          </p:style>
+          <p:txBody>
+            <a:bodyPr rot="0" spcFirstLastPara="0" vertOverflow="overflow" horzOverflow="overflow" vert="horz" wrap="square" lIns="0" tIns="45720" rIns="0" bIns="45720" numCol="1" spcCol="0" rtlCol="0" fromWordArt="0" anchor="ctr" anchorCtr="0" forceAA="0" compatLnSpc="1">
+              <a:prstTxWarp prst="textNoShape">
+                <a:avLst/>
+              </a:prstTxWarp>
+              <a:noAutofit/>
+            </a:bodyPr>
+            <a:lstStyle/>
+            <a:p>
+              <a:pPr algn="ctr"/>
+              <a:r>
+                <a:rPr lang="en-US" sz="1200" dirty="0">
+                  <a:latin typeface="Arial"/>
+                  <a:cs typeface="Arial"/>
+                </a:rPr>
+                <a:t>V</a:t>
+              </a:r>
+            </a:p>
+          </p:txBody>
+        </p:sp>
+      </p:grpSp>
+      <p:sp>
+        <p:nvSpPr>
+          <p:cNvPr id="50" name="Rectangle 49"/>
+          <p:cNvSpPr/>
+          <p:nvPr/>
+        </p:nvSpPr>
+        <p:spPr>
+          <a:xfrm>
+            <a:off x="1756615" y="3149600"/>
+            <a:ext cx="228600" cy="374650"/>
+          </a:xfrm>
+          <a:prstGeom prst="rect">
+            <a:avLst/>
+          </a:prstGeom>
+          <a:solidFill>
+            <a:schemeClr val="accent3"/>
+          </a:solidFill>
+          <a:ln>
+            <a:solidFill>
+              <a:schemeClr val="tx1"/>
+            </a:solidFill>
+          </a:ln>
+          <a:effectLst/>
+        </p:spPr>
+        <p:style>
+          <a:lnRef idx="1">
+            <a:schemeClr val="accent1"/>
+          </a:lnRef>
+          <a:fillRef idx="3">
+            <a:schemeClr val="accent1"/>
+          </a:fillRef>
+          <a:effectRef idx="2">
+            <a:schemeClr val="accent1"/>
+          </a:effectRef>
+          <a:fontRef idx="minor">
+            <a:schemeClr val="lt1"/>
+          </a:fontRef>
+        </p:style>
+        <p:txBody>
+          <a:bodyPr rtlCol="0" anchor="ctr"/>
+          <a:lstStyle/>
+          <a:p>
+            <a:pPr algn="ctr"/>
+            <a:endParaRPr lang="en-US" sz="1200">
+              <a:latin typeface="Arial"/>
+              <a:cs typeface="Arial"/>
+            </a:endParaRPr>
+          </a:p>
+        </p:txBody>
+      </p:sp>
+      <p:sp>
+        <p:nvSpPr>
+          <p:cNvPr id="51" name="Rectangle 50"/>
+          <p:cNvSpPr/>
+          <p:nvPr/>
+        </p:nvSpPr>
+        <p:spPr>
+          <a:xfrm>
+            <a:off x="1528015" y="3149600"/>
+            <a:ext cx="228600" cy="374650"/>
+          </a:xfrm>
+          <a:prstGeom prst="rect">
+            <a:avLst/>
+          </a:prstGeom>
+          <a:noFill/>
+          <a:ln>
+            <a:solidFill>
+              <a:schemeClr val="tx1"/>
+            </a:solidFill>
+          </a:ln>
+          <a:effectLst/>
+        </p:spPr>
+        <p:style>
+          <a:lnRef idx="1">
+            <a:schemeClr val="accent1"/>
+          </a:lnRef>
+          <a:fillRef idx="3">
+            <a:schemeClr val="accent1"/>
+          </a:fillRef>
+          <a:effectRef idx="2">
+            <a:schemeClr val="accent1"/>
+          </a:effectRef>
+          <a:fontRef idx="minor">
+            <a:schemeClr val="lt1"/>
+          </a:fontRef>
+        </p:style>
+        <p:txBody>
+          <a:bodyPr rtlCol="0" anchor="ctr"/>
+          <a:lstStyle/>
+          <a:p>
+            <a:pPr algn="ctr"/>
+            <a:endParaRPr lang="en-US"/>
+          </a:p>
+        </p:txBody>
+      </p:sp>
+      <p:sp>
+        <p:nvSpPr>
+          <p:cNvPr id="52" name="Rectangle 51"/>
+          <p:cNvSpPr/>
+          <p:nvPr/>
+        </p:nvSpPr>
+        <p:spPr>
+          <a:xfrm>
+            <a:off x="1985215" y="3149600"/>
+            <a:ext cx="228600" cy="374650"/>
+          </a:xfrm>
+          <a:prstGeom prst="rect">
+            <a:avLst/>
+          </a:prstGeom>
+          <a:solidFill>
+            <a:schemeClr val="accent3"/>
+          </a:solidFill>
+          <a:ln>
+            <a:solidFill>
+              <a:schemeClr val="tx1"/>
+            </a:solidFill>
+          </a:ln>
+          <a:effectLst/>
+        </p:spPr>
+        <p:style>
+          <a:lnRef idx="1">
+            <a:schemeClr val="accent1"/>
+          </a:lnRef>
+          <a:fillRef idx="3">
+            <a:schemeClr val="accent1"/>
+          </a:fillRef>
+          <a:effectRef idx="2">
+            <a:schemeClr val="accent1"/>
+          </a:effectRef>
+          <a:fontRef idx="minor">
+            <a:schemeClr val="lt1"/>
+          </a:fontRef>
+        </p:style>
+        <p:txBody>
+          <a:bodyPr rtlCol="0" anchor="ctr"/>
+          <a:lstStyle/>
+          <a:p>
+            <a:pPr algn="ctr"/>
+            <a:endParaRPr lang="en-US" sz="1200">
+              <a:latin typeface="Arial"/>
+              <a:cs typeface="Arial"/>
+            </a:endParaRPr>
+          </a:p>
+        </p:txBody>
+      </p:sp>
+      <p:sp>
+        <p:nvSpPr>
+          <p:cNvPr id="53" name="Rectangle 52"/>
+          <p:cNvSpPr/>
+          <p:nvPr/>
+        </p:nvSpPr>
+        <p:spPr>
+          <a:xfrm>
+            <a:off x="7014415" y="3149600"/>
+            <a:ext cx="228600" cy="374650"/>
+          </a:xfrm>
+          <a:prstGeom prst="rect">
+            <a:avLst/>
+          </a:prstGeom>
+          <a:solidFill>
+            <a:schemeClr val="accent5">
+              <a:lumMod val="75000"/>
+            </a:schemeClr>
+          </a:solidFill>
+          <a:ln>
+            <a:solidFill>
+              <a:schemeClr val="tx1"/>
+            </a:solidFill>
+          </a:ln>
+          <a:effectLst/>
+        </p:spPr>
+        <p:style>
+          <a:lnRef idx="1">
+            <a:schemeClr val="accent1"/>
+          </a:lnRef>
+          <a:fillRef idx="3">
+            <a:schemeClr val="accent1"/>
+          </a:fillRef>
+          <a:effectRef idx="2">
+            <a:schemeClr val="accent1"/>
+          </a:effectRef>
+          <a:fontRef idx="minor">
+            <a:schemeClr val="lt1"/>
+          </a:fontRef>
+        </p:style>
+        <p:txBody>
+          <a:bodyPr rot="0" spcFirstLastPara="0" vertOverflow="overflow" horzOverflow="overflow" vert="horz" wrap="square" lIns="0" tIns="45720" rIns="0" bIns="45720" numCol="1" spcCol="0" rtlCol="0" fromWordArt="0" anchor="ctr" anchorCtr="0" forceAA="0" compatLnSpc="1">
+            <a:prstTxWarp prst="textNoShape">
+              <a:avLst/>
+            </a:prstTxWarp>
+            <a:noAutofit/>
+          </a:bodyPr>
+          <a:lstStyle/>
+          <a:p>
+            <a:pPr algn="ctr"/>
+            <a:endParaRPr lang="en-US" sz="1200">
+              <a:latin typeface="Arial"/>
+              <a:cs typeface="Arial"/>
+            </a:endParaRPr>
+          </a:p>
+        </p:txBody>
+      </p:sp>
+      <p:sp>
+        <p:nvSpPr>
+          <p:cNvPr id="54" name="Rectangle 53"/>
+          <p:cNvSpPr/>
+          <p:nvPr/>
+        </p:nvSpPr>
+        <p:spPr>
+          <a:xfrm>
+            <a:off x="7471615" y="3149600"/>
+            <a:ext cx="228600" cy="374650"/>
+          </a:xfrm>
+          <a:prstGeom prst="rect">
+            <a:avLst/>
+          </a:prstGeom>
+          <a:solidFill>
+            <a:schemeClr val="accent5">
+              <a:lumMod val="75000"/>
+            </a:schemeClr>
+          </a:solidFill>
+          <a:ln>
+            <a:solidFill>
+              <a:schemeClr val="tx1"/>
+            </a:solidFill>
+          </a:ln>
+          <a:effectLst/>
+        </p:spPr>
+        <p:style>
+          <a:lnRef idx="1">
+            <a:schemeClr val="accent1"/>
+          </a:lnRef>
+          <a:fillRef idx="3">
+            <a:schemeClr val="accent1"/>
+          </a:fillRef>
+          <a:effectRef idx="2">
+            <a:schemeClr val="accent1"/>
+          </a:effectRef>
+          <a:fontRef idx="minor">
+            <a:schemeClr val="lt1"/>
+          </a:fontRef>
+        </p:style>
+        <p:txBody>
+          <a:bodyPr rot="0" spcFirstLastPara="0" vertOverflow="overflow" horzOverflow="overflow" vert="horz" wrap="square" lIns="0" tIns="45720" rIns="0" bIns="45720" numCol="1" spcCol="0" rtlCol="0" fromWordArt="0" anchor="ctr" anchorCtr="0" forceAA="0" compatLnSpc="1">
+            <a:prstTxWarp prst="textNoShape">
+              <a:avLst/>
+            </a:prstTxWarp>
+            <a:noAutofit/>
+          </a:bodyPr>
+          <a:lstStyle/>
+          <a:p>
+            <a:pPr algn="ctr"/>
+            <a:endParaRPr lang="en-US" sz="1200">
+              <a:latin typeface="Arial"/>
+              <a:cs typeface="Arial"/>
+            </a:endParaRPr>
+          </a:p>
+        </p:txBody>
+      </p:sp>
+      <p:sp>
+        <p:nvSpPr>
+          <p:cNvPr id="55" name="Rectangle 54"/>
+          <p:cNvSpPr/>
+          <p:nvPr/>
+        </p:nvSpPr>
+        <p:spPr>
+          <a:xfrm>
+            <a:off x="7243015" y="3149600"/>
+            <a:ext cx="228600" cy="374650"/>
+          </a:xfrm>
+          <a:prstGeom prst="rect">
+            <a:avLst/>
+          </a:prstGeom>
+          <a:solidFill>
+            <a:schemeClr val="accent5">
+              <a:lumMod val="75000"/>
+            </a:schemeClr>
+          </a:solidFill>
+          <a:ln>
+            <a:solidFill>
+              <a:schemeClr val="tx1"/>
+            </a:solidFill>
+          </a:ln>
+          <a:effectLst/>
+        </p:spPr>
+        <p:style>
+          <a:lnRef idx="1">
+            <a:schemeClr val="accent1"/>
+          </a:lnRef>
+          <a:fillRef idx="3">
+            <a:schemeClr val="accent1"/>
+          </a:fillRef>
+          <a:effectRef idx="2">
+            <a:schemeClr val="accent1"/>
+          </a:effectRef>
+          <a:fontRef idx="minor">
+            <a:schemeClr val="lt1"/>
+          </a:fontRef>
+        </p:style>
+        <p:txBody>
+          <a:bodyPr rot="0" spcFirstLastPara="0" vertOverflow="overflow" horzOverflow="overflow" vert="horz" wrap="square" lIns="0" tIns="45720" rIns="0" bIns="45720" numCol="1" spcCol="0" rtlCol="0" fromWordArt="0" anchor="ctr" anchorCtr="0" forceAA="0" compatLnSpc="1">
+            <a:prstTxWarp prst="textNoShape">
+              <a:avLst/>
+            </a:prstTxWarp>
+            <a:noAutofit/>
+          </a:bodyPr>
+          <a:lstStyle/>
+          <a:p>
+            <a:pPr algn="ctr"/>
+            <a:endParaRPr lang="en-US" sz="1200">
+              <a:latin typeface="Arial"/>
+              <a:cs typeface="Arial"/>
+            </a:endParaRPr>
+          </a:p>
+        </p:txBody>
+      </p:sp>
+      <p:sp>
+        <p:nvSpPr>
+          <p:cNvPr id="56" name="TextBox 55"/>
+          <p:cNvSpPr txBox="1"/>
+          <p:nvPr/>
+        </p:nvSpPr>
+        <p:spPr>
+          <a:xfrm>
+            <a:off x="3635873" y="3657600"/>
+            <a:ext cx="2006942" cy="307777"/>
+          </a:xfrm>
+          <a:prstGeom prst="rect">
+            <a:avLst/>
+          </a:prstGeom>
+          <a:noFill/>
+        </p:spPr>
+        <p:txBody>
+          <a:bodyPr wrap="none" rtlCol="0">
+            <a:spAutoFit/>
+          </a:bodyPr>
+          <a:lstStyle/>
+          <a:p>
+            <a:r>
+              <a:rPr lang="en-US" sz="1400" dirty="0" smtClean="0">
+                <a:latin typeface="Arial"/>
+                <a:cs typeface="Arial"/>
+              </a:rPr>
+              <a:t>TDMA Slots in TMACN</a:t>
+            </a:r>
+            <a:endParaRPr lang="en-US" sz="1400" dirty="0">
+              <a:latin typeface="Arial"/>
+              <a:cs typeface="Arial"/>
+            </a:endParaRPr>
+          </a:p>
+        </p:txBody>
+      </p:sp>
+      <p:sp>
+        <p:nvSpPr>
+          <p:cNvPr id="57" name="TextBox 56"/>
+          <p:cNvSpPr txBox="1"/>
+          <p:nvPr/>
+        </p:nvSpPr>
+        <p:spPr>
+          <a:xfrm>
+            <a:off x="3813783" y="1760834"/>
+            <a:ext cx="1741232" cy="307777"/>
+          </a:xfrm>
+          <a:prstGeom prst="rect">
+            <a:avLst/>
+          </a:prstGeom>
+          <a:noFill/>
+        </p:spPr>
+        <p:txBody>
+          <a:bodyPr wrap="none" rtlCol="0">
+            <a:spAutoFit/>
+          </a:bodyPr>
+          <a:lstStyle/>
+          <a:p>
+            <a:r>
+              <a:rPr lang="en-US" sz="1400" dirty="0" smtClean="0">
+                <a:latin typeface="Arial"/>
+                <a:cs typeface="Arial"/>
+              </a:rPr>
+              <a:t>SOIA Logic Frames</a:t>
+            </a:r>
+            <a:endParaRPr lang="en-US" sz="1400" dirty="0">
+              <a:latin typeface="Arial"/>
+              <a:cs typeface="Arial"/>
+            </a:endParaRPr>
+          </a:p>
+        </p:txBody>
+      </p:sp>
+      <p:cxnSp>
+        <p:nvCxnSpPr>
+          <p:cNvPr id="59" name="Straight Arrow Connector 58"/>
+          <p:cNvCxnSpPr>
+            <a:stCxn id="57" idx="2"/>
+          </p:cNvCxnSpPr>
+          <p:nvPr/>
+        </p:nvCxnSpPr>
+        <p:spPr>
+          <a:xfrm flipH="1">
+            <a:off x="4406900" y="2068611"/>
+            <a:ext cx="277499" cy="331689"/>
+          </a:xfrm>
+          <a:prstGeom prst="straightConnector1">
+            <a:avLst/>
+          </a:prstGeom>
+          <a:ln w="9525" cmpd="sng">
+            <a:solidFill>
+              <a:schemeClr val="tx1"/>
+            </a:solidFill>
+            <a:prstDash val="sysDot"/>
+            <a:tailEnd type="triangle"/>
+          </a:ln>
+          <a:effectLst/>
+        </p:spPr>
+        <p:style>
+          <a:lnRef idx="2">
+            <a:schemeClr val="accent1"/>
+          </a:lnRef>
+          <a:fillRef idx="0">
+            <a:schemeClr val="accent1"/>
+          </a:fillRef>
+          <a:effectRef idx="1">
+            <a:schemeClr val="accent1"/>
+          </a:effectRef>
+          <a:fontRef idx="minor">
+            <a:schemeClr val="tx1"/>
+          </a:fontRef>
+        </p:style>
+      </p:cxnSp>
+      <p:cxnSp>
+        <p:nvCxnSpPr>
+          <p:cNvPr id="61" name="Straight Arrow Connector 60"/>
+          <p:cNvCxnSpPr>
+            <a:stCxn id="57" idx="2"/>
+            <a:endCxn id="45" idx="0"/>
+          </p:cNvCxnSpPr>
+          <p:nvPr/>
+        </p:nvCxnSpPr>
+        <p:spPr>
+          <a:xfrm>
+            <a:off x="4684399" y="2068611"/>
+            <a:ext cx="318082" cy="318989"/>
+          </a:xfrm>
+          <a:prstGeom prst="straightConnector1">
+            <a:avLst/>
+          </a:prstGeom>
+          <a:ln w="9525" cmpd="sng">
+            <a:solidFill>
+              <a:schemeClr val="tx1"/>
+            </a:solidFill>
+            <a:prstDash val="sysDot"/>
+            <a:tailEnd type="triangle"/>
+          </a:ln>
+          <a:effectLst/>
+        </p:spPr>
+        <p:style>
+          <a:lnRef idx="2">
+            <a:schemeClr val="accent1"/>
+          </a:lnRef>
+          <a:fillRef idx="0">
+            <a:schemeClr val="accent1"/>
+          </a:fillRef>
+          <a:effectRef idx="1">
+            <a:schemeClr val="accent1"/>
+          </a:effectRef>
+          <a:fontRef idx="minor">
+            <a:schemeClr val="tx1"/>
+          </a:fontRef>
+        </p:style>
+      </p:cxnSp>
+      <p:sp>
+        <p:nvSpPr>
+          <p:cNvPr id="63" name="TextBox 62"/>
+          <p:cNvSpPr txBox="1"/>
+          <p:nvPr/>
+        </p:nvSpPr>
+        <p:spPr>
+          <a:xfrm>
+            <a:off x="1718283" y="1875134"/>
+            <a:ext cx="954483" cy="246221"/>
+          </a:xfrm>
+          <a:prstGeom prst="rect">
+            <a:avLst/>
+          </a:prstGeom>
+          <a:noFill/>
+        </p:spPr>
+        <p:txBody>
+          <a:bodyPr wrap="none" rtlCol="0">
+            <a:spAutoFit/>
+          </a:bodyPr>
+          <a:lstStyle/>
+          <a:p>
+            <a:r>
+              <a:rPr lang="en-US" sz="1000" dirty="0" smtClean="0">
+                <a:latin typeface="Arial"/>
+                <a:cs typeface="Arial"/>
+              </a:rPr>
+              <a:t>Fixed Header</a:t>
+            </a:r>
+            <a:endParaRPr lang="en-US" sz="1000" dirty="0">
+              <a:latin typeface="Arial"/>
+              <a:cs typeface="Arial"/>
+            </a:endParaRPr>
+          </a:p>
+        </p:txBody>
+      </p:sp>
+      <p:cxnSp>
+        <p:nvCxnSpPr>
+          <p:cNvPr id="65" name="Straight Arrow Connector 64"/>
+          <p:cNvCxnSpPr>
+            <a:stCxn id="63" idx="2"/>
+            <a:endCxn id="42" idx="0"/>
+          </p:cNvCxnSpPr>
+          <p:nvPr/>
+        </p:nvCxnSpPr>
+        <p:spPr>
+          <a:xfrm flipH="1">
+            <a:off x="2055065" y="2121355"/>
+            <a:ext cx="140460" cy="278945"/>
+          </a:xfrm>
+          <a:prstGeom prst="straightConnector1">
+            <a:avLst/>
+          </a:prstGeom>
+          <a:ln w="9525" cmpd="sng">
+            <a:solidFill>
+              <a:schemeClr val="tx1"/>
+            </a:solidFill>
+            <a:prstDash val="sysDot"/>
+            <a:tailEnd type="triangle"/>
+          </a:ln>
+          <a:effectLst/>
+        </p:spPr>
+        <p:style>
+          <a:lnRef idx="2">
+            <a:schemeClr val="accent1"/>
+          </a:lnRef>
+          <a:fillRef idx="0">
+            <a:schemeClr val="accent1"/>
+          </a:fillRef>
+          <a:effectRef idx="1">
+            <a:schemeClr val="accent1"/>
+          </a:effectRef>
+          <a:fontRef idx="minor">
+            <a:schemeClr val="tx1"/>
+          </a:fontRef>
+        </p:style>
+      </p:cxnSp>
+      <p:sp>
+        <p:nvSpPr>
+          <p:cNvPr id="66" name="TextBox 65"/>
+          <p:cNvSpPr txBox="1"/>
+          <p:nvPr/>
+        </p:nvSpPr>
+        <p:spPr>
+          <a:xfrm>
+            <a:off x="5571492" y="1914722"/>
+            <a:ext cx="1531188" cy="246221"/>
+          </a:xfrm>
+          <a:prstGeom prst="rect">
+            <a:avLst/>
+          </a:prstGeom>
+          <a:noFill/>
+        </p:spPr>
+        <p:txBody>
+          <a:bodyPr wrap="none" rtlCol="0">
+            <a:spAutoFit/>
+          </a:bodyPr>
+          <a:lstStyle/>
+          <a:p>
+            <a:r>
+              <a:rPr lang="en-US" sz="1000" dirty="0" smtClean="0">
+                <a:latin typeface="Arial"/>
+                <a:cs typeface="Arial"/>
+              </a:rPr>
+              <a:t>Variable Length Header</a:t>
+            </a:r>
+            <a:endParaRPr lang="en-US" sz="1000" dirty="0">
+              <a:latin typeface="Arial"/>
+              <a:cs typeface="Arial"/>
+            </a:endParaRPr>
+          </a:p>
+        </p:txBody>
+      </p:sp>
+      <p:cxnSp>
+        <p:nvCxnSpPr>
+          <p:cNvPr id="68" name="Straight Arrow Connector 67"/>
+          <p:cNvCxnSpPr>
+            <a:stCxn id="66" idx="2"/>
+            <a:endCxn id="46" idx="0"/>
+          </p:cNvCxnSpPr>
+          <p:nvPr/>
+        </p:nvCxnSpPr>
+        <p:spPr>
+          <a:xfrm flipH="1">
+            <a:off x="5336515" y="2160943"/>
+            <a:ext cx="1000571" cy="226657"/>
+          </a:xfrm>
+          <a:prstGeom prst="straightConnector1">
+            <a:avLst/>
+          </a:prstGeom>
+          <a:ln w="9525" cmpd="sng">
+            <a:solidFill>
+              <a:schemeClr val="tx1"/>
+            </a:solidFill>
+            <a:prstDash val="sysDot"/>
+            <a:tailEnd type="triangle"/>
+          </a:ln>
+          <a:effectLst/>
+        </p:spPr>
+        <p:style>
+          <a:lnRef idx="2">
+            <a:schemeClr val="accent1"/>
+          </a:lnRef>
+          <a:fillRef idx="0">
+            <a:schemeClr val="accent1"/>
+          </a:fillRef>
+          <a:effectRef idx="1">
+            <a:schemeClr val="accent1"/>
+          </a:effectRef>
+          <a:fontRef idx="minor">
+            <a:schemeClr val="tx1"/>
+          </a:fontRef>
+        </p:style>
+      </p:cxnSp>
+      <p:cxnSp>
+        <p:nvCxnSpPr>
+          <p:cNvPr id="70" name="Straight Arrow Connector 69"/>
+          <p:cNvCxnSpPr>
+            <a:stCxn id="38" idx="2"/>
+            <a:endCxn id="52" idx="0"/>
+          </p:cNvCxnSpPr>
+          <p:nvPr/>
+        </p:nvCxnSpPr>
+        <p:spPr>
+          <a:xfrm flipH="1">
+            <a:off x="2099515" y="2774950"/>
+            <a:ext cx="1371600" cy="374650"/>
+          </a:xfrm>
+          <a:prstGeom prst="straightConnector1">
+            <a:avLst/>
+          </a:prstGeom>
+          <a:ln>
+            <a:solidFill>
+              <a:schemeClr val="accent3">
+                <a:lumMod val="75000"/>
+              </a:schemeClr>
+            </a:solidFill>
+            <a:tailEnd type="triangle"/>
+          </a:ln>
+          <a:effectLst/>
+        </p:spPr>
+        <p:style>
+          <a:lnRef idx="2">
+            <a:schemeClr val="accent1"/>
+          </a:lnRef>
+          <a:fillRef idx="0">
+            <a:schemeClr val="accent1"/>
+          </a:fillRef>
+          <a:effectRef idx="1">
+            <a:schemeClr val="accent1"/>
+          </a:effectRef>
+          <a:fontRef idx="minor">
+            <a:schemeClr val="tx1"/>
+          </a:fontRef>
+        </p:style>
+      </p:cxnSp>
+      <p:cxnSp>
+        <p:nvCxnSpPr>
+          <p:cNvPr id="72" name="Straight Arrow Connector 71"/>
+          <p:cNvCxnSpPr>
+            <a:stCxn id="38" idx="2"/>
+            <a:endCxn id="9" idx="0"/>
+          </p:cNvCxnSpPr>
+          <p:nvPr/>
+        </p:nvCxnSpPr>
+        <p:spPr>
+          <a:xfrm flipH="1">
+            <a:off x="3242515" y="2774950"/>
+            <a:ext cx="228600" cy="374650"/>
+          </a:xfrm>
+          <a:prstGeom prst="straightConnector1">
+            <a:avLst/>
+          </a:prstGeom>
+          <a:ln>
+            <a:solidFill>
+              <a:schemeClr val="accent3">
+                <a:lumMod val="75000"/>
+              </a:schemeClr>
+            </a:solidFill>
+            <a:tailEnd type="triangle"/>
+          </a:ln>
+          <a:effectLst/>
+        </p:spPr>
+        <p:style>
+          <a:lnRef idx="2">
+            <a:schemeClr val="accent1"/>
+          </a:lnRef>
+          <a:fillRef idx="0">
+            <a:schemeClr val="accent1"/>
+          </a:fillRef>
+          <a:effectRef idx="1">
+            <a:schemeClr val="accent1"/>
+          </a:effectRef>
+          <a:fontRef idx="minor">
+            <a:schemeClr val="tx1"/>
+          </a:fontRef>
+        </p:style>
+      </p:cxnSp>
+      <p:cxnSp>
+        <p:nvCxnSpPr>
+          <p:cNvPr id="74" name="Straight Arrow Connector 73"/>
+          <p:cNvCxnSpPr>
+            <a:stCxn id="38" idx="2"/>
+            <a:endCxn id="17" idx="0"/>
+          </p:cNvCxnSpPr>
+          <p:nvPr/>
+        </p:nvCxnSpPr>
+        <p:spPr>
+          <a:xfrm>
+            <a:off x="3471115" y="2774950"/>
+            <a:ext cx="1600200" cy="374650"/>
+          </a:xfrm>
+          <a:prstGeom prst="straightConnector1">
+            <a:avLst/>
+          </a:prstGeom>
+          <a:ln>
+            <a:solidFill>
+              <a:schemeClr val="accent3">
+                <a:lumMod val="75000"/>
+              </a:schemeClr>
+            </a:solidFill>
+            <a:tailEnd type="triangle"/>
+          </a:ln>
+          <a:effectLst/>
+        </p:spPr>
+        <p:style>
+          <a:lnRef idx="2">
+            <a:schemeClr val="accent1"/>
+          </a:lnRef>
+          <a:fillRef idx="0">
+            <a:schemeClr val="accent1"/>
+          </a:fillRef>
+          <a:effectRef idx="1">
+            <a:schemeClr val="accent1"/>
+          </a:effectRef>
+          <a:fontRef idx="minor">
+            <a:schemeClr val="tx1"/>
+          </a:fontRef>
+        </p:style>
+      </p:cxnSp>
+      <p:cxnSp>
+        <p:nvCxnSpPr>
+          <p:cNvPr id="77" name="Straight Arrow Connector 76"/>
+          <p:cNvCxnSpPr>
+            <a:stCxn id="44" idx="2"/>
+            <a:endCxn id="10" idx="0"/>
+          </p:cNvCxnSpPr>
+          <p:nvPr/>
+        </p:nvCxnSpPr>
+        <p:spPr>
+          <a:xfrm flipH="1">
+            <a:off x="3928315" y="2762250"/>
+            <a:ext cx="2740533" cy="387350"/>
+          </a:xfrm>
+          <a:prstGeom prst="straightConnector1">
+            <a:avLst/>
+          </a:prstGeom>
+          <a:ln>
+            <a:solidFill>
+              <a:schemeClr val="accent5">
+                <a:lumMod val="75000"/>
+              </a:schemeClr>
+            </a:solidFill>
+            <a:tailEnd type="triangle"/>
+          </a:ln>
+          <a:effectLst/>
+        </p:spPr>
+        <p:style>
+          <a:lnRef idx="2">
+            <a:schemeClr val="accent1"/>
+          </a:lnRef>
+          <a:fillRef idx="0">
+            <a:schemeClr val="accent1"/>
+          </a:fillRef>
+          <a:effectRef idx="1">
+            <a:schemeClr val="accent1"/>
+          </a:effectRef>
+          <a:fontRef idx="minor">
+            <a:schemeClr val="tx1"/>
+          </a:fontRef>
+        </p:style>
+      </p:cxnSp>
+      <p:cxnSp>
+        <p:nvCxnSpPr>
+          <p:cNvPr id="79" name="Straight Arrow Connector 78"/>
+          <p:cNvCxnSpPr>
+            <a:stCxn id="44" idx="2"/>
+            <a:endCxn id="22" idx="0"/>
+          </p:cNvCxnSpPr>
+          <p:nvPr/>
+        </p:nvCxnSpPr>
+        <p:spPr>
+          <a:xfrm flipH="1">
+            <a:off x="6214315" y="2762250"/>
+            <a:ext cx="454533" cy="387350"/>
+          </a:xfrm>
+          <a:prstGeom prst="straightConnector1">
+            <a:avLst/>
+          </a:prstGeom>
+          <a:ln>
+            <a:solidFill>
+              <a:schemeClr val="accent5">
+                <a:lumMod val="75000"/>
+              </a:schemeClr>
+            </a:solidFill>
+            <a:tailEnd type="triangle"/>
+          </a:ln>
+          <a:effectLst/>
+        </p:spPr>
+        <p:style>
+          <a:lnRef idx="2">
+            <a:schemeClr val="accent1"/>
+          </a:lnRef>
+          <a:fillRef idx="0">
+            <a:schemeClr val="accent1"/>
+          </a:fillRef>
+          <a:effectRef idx="1">
+            <a:schemeClr val="accent1"/>
+          </a:effectRef>
+          <a:fontRef idx="minor">
+            <a:schemeClr val="tx1"/>
+          </a:fontRef>
+        </p:style>
+      </p:cxnSp>
+      <p:cxnSp>
+        <p:nvCxnSpPr>
+          <p:cNvPr id="81" name="Straight Arrow Connector 80"/>
+          <p:cNvCxnSpPr>
+            <a:stCxn id="44" idx="2"/>
+            <a:endCxn id="55" idx="0"/>
+          </p:cNvCxnSpPr>
+          <p:nvPr/>
+        </p:nvCxnSpPr>
+        <p:spPr>
+          <a:xfrm>
+            <a:off x="6668848" y="2762250"/>
+            <a:ext cx="688467" cy="387350"/>
+          </a:xfrm>
+          <a:prstGeom prst="straightConnector1">
+            <a:avLst/>
+          </a:prstGeom>
+          <a:ln>
+            <a:solidFill>
+              <a:schemeClr val="accent5">
+                <a:lumMod val="75000"/>
+              </a:schemeClr>
+            </a:solidFill>
+            <a:tailEnd type="triangle"/>
+          </a:ln>
+          <a:effectLst/>
+        </p:spPr>
+        <p:style>
+          <a:lnRef idx="2">
+            <a:schemeClr val="accent1"/>
+          </a:lnRef>
+          <a:fillRef idx="0">
+            <a:schemeClr val="accent1"/>
+          </a:fillRef>
+          <a:effectRef idx="1">
+            <a:schemeClr val="accent1"/>
+          </a:effectRef>
+          <a:fontRef idx="minor">
+            <a:schemeClr val="tx1"/>
+          </a:fontRef>
+        </p:style>
+      </p:cxnSp>
+    </p:spTree>
+    <p:extLst>
+      <p:ext uri="{BB962C8B-B14F-4D97-AF65-F5344CB8AC3E}">
+        <p14:creationId xmlns:p14="http://schemas.microsoft.com/office/powerpoint/2010/main" val="1691935554"/>
       </p:ext>
     </p:extLst>
   </p:cSld>

</xml_diff>